<commit_message>
Angst und Wut Maske done
</commit_message>
<xml_diff>
--- a/Design Stuff/Narrativ/Masken/Angst Maske.pptx
+++ b/Design Stuff/Narrativ/Masken/Angst Maske.pptx
@@ -6,30 +6,29 @@
     <p:sldMasterId id="2147483660" r:id="rId2"/>
   </p:sldMasterIdLst>
   <p:notesMasterIdLst>
-    <p:notesMasterId r:id="rId9"/>
+    <p:notesMasterId r:id="rId8"/>
   </p:notesMasterIdLst>
   <p:sldIdLst>
     <p:sldId id="256" r:id="rId3"/>
     <p:sldId id="257" r:id="rId4"/>
     <p:sldId id="258" r:id="rId5"/>
     <p:sldId id="259" r:id="rId6"/>
-    <p:sldId id="262" r:id="rId7"/>
-    <p:sldId id="263" r:id="rId8"/>
+    <p:sldId id="263" r:id="rId7"/>
   </p:sldIdLst>
   <p:sldSz cx="9144000" cy="5143500" type="screen16x9"/>
   <p:notesSz cx="6858000" cy="9144000"/>
   <p:embeddedFontLst>
     <p:embeddedFont>
       <p:font typeface="Montserrat" panose="00000500000000000000" pitchFamily="2" charset="0"/>
-      <p:regular r:id="rId10"/>
-      <p:bold r:id="rId11"/>
-      <p:italic r:id="rId12"/>
-      <p:boldItalic r:id="rId13"/>
+      <p:regular r:id="rId9"/>
+      <p:bold r:id="rId10"/>
+      <p:italic r:id="rId11"/>
+      <p:boldItalic r:id="rId12"/>
     </p:embeddedFont>
     <p:embeddedFont>
       <p:font typeface="Montserrat ExtraBold" panose="00000900000000000000" pitchFamily="2" charset="0"/>
-      <p:bold r:id="rId14"/>
-      <p:boldItalic r:id="rId15"/>
+      <p:bold r:id="rId13"/>
+      <p:boldItalic r:id="rId14"/>
     </p:embeddedFont>
   </p:embeddedFontLst>
   <p:defaultTextStyle>
@@ -277,7 +276,7 @@
       </p15:sldGuideLst>
     </p:ext>
     <p:ext uri="GoogleSlidesCustomDataVersion2">
-      <go:slidesCustomData xmlns="" xmlns:mc="http://schemas.openxmlformats.org/markup-compatibility/2006" xmlns:mv="urn:schemas-microsoft-com:mac:vml" xmlns:c="http://schemas.openxmlformats.org/drawingml/2006/chart" xmlns:dgm="http://schemas.openxmlformats.org/drawingml/2006/diagram" xmlns:o="urn:schemas-microsoft-com:office:office" xmlns:v="urn:schemas-microsoft-com:vml" xmlns:pvml="urn:schemas-microsoft-com:office:powerpoint" xmlns:com="http://schemas.openxmlformats.org/drawingml/2006/compatibility" xmlns:p14="http://schemas.microsoft.com/office/powerpoint/2010/main" xmlns:p15="http://schemas.microsoft.com/office/powerpoint/2012/main" xmlns:ahyp="http://schemas.microsoft.com/office/drawing/2018/hyperlinkcolor" xmlns:go="http://customooxmlschemas.google.com/" r:id="rId22" roundtripDataSignature="AMtx7mjTz30nbRXKs5E3vrOIH3TGAJARHw=="/>
+      <go:slidesCustomData xmlns:go="http://customooxmlschemas.google.com/" xmlns:ahyp="http://schemas.microsoft.com/office/drawing/2018/hyperlinkcolor" xmlns:p15="http://schemas.microsoft.com/office/powerpoint/2012/main" xmlns:p14="http://schemas.microsoft.com/office/powerpoint/2010/main" xmlns:com="http://schemas.openxmlformats.org/drawingml/2006/compatibility" xmlns:pvml="urn:schemas-microsoft-com:office:powerpoint" xmlns:v="urn:schemas-microsoft-com:vml" xmlns:o="urn:schemas-microsoft-com:office:office" xmlns:dgm="http://schemas.openxmlformats.org/drawingml/2006/diagram" xmlns:c="http://schemas.openxmlformats.org/drawingml/2006/chart" xmlns:mv="urn:schemas-microsoft-com:mac:vml" xmlns:mc="http://schemas.openxmlformats.org/markup-compatibility/2006" xmlns="" r:id="rId22" roundtripDataSignature="AMtx7mjTz30nbRXKs5E3vrOIH3TGAJARHw=="/>
     </p:ext>
   </p:extLst>
 </p:presentation>
@@ -1364,168 +1363,6 @@
 </file>
 
 <file path=ppt/notesSlides/notesSlide5.xml><?xml version="1.0" encoding="utf-8"?>
-<p:notes xmlns:a="http://schemas.openxmlformats.org/drawingml/2006/main" xmlns:r="http://schemas.openxmlformats.org/officeDocument/2006/relationships" xmlns:p="http://schemas.openxmlformats.org/presentationml/2006/main" showMasterSp="0" showMasterPhAnim="0">
-  <p:cSld>
-    <p:spTree>
-      <p:nvGrpSpPr>
-        <p:cNvPr id="1" name="Shape 233"/>
-        <p:cNvGrpSpPr/>
-        <p:nvPr/>
-      </p:nvGrpSpPr>
-      <p:grpSpPr>
-        <a:xfrm>
-          <a:off x="0" y="0"/>
-          <a:ext cx="0" cy="0"/>
-          <a:chOff x="0" y="0"/>
-          <a:chExt cx="0" cy="0"/>
-        </a:xfrm>
-      </p:grpSpPr>
-      <p:sp>
-        <p:nvSpPr>
-          <p:cNvPr id="234" name="Google Shape;234;p6:notes"/>
-          <p:cNvSpPr>
-            <a:spLocks noGrp="1" noRot="1" noChangeAspect="1"/>
-          </p:cNvSpPr>
-          <p:nvPr>
-            <p:ph type="sldImg" idx="2"/>
-          </p:nvPr>
-        </p:nvSpPr>
-        <p:spPr>
-          <a:xfrm>
-            <a:off x="381000" y="685800"/>
-            <a:ext cx="6096000" cy="3429000"/>
-          </a:xfrm>
-          <a:custGeom>
-            <a:avLst/>
-            <a:gdLst/>
-            <a:ahLst/>
-            <a:cxnLst/>
-            <a:rect l="l" t="t" r="r" b="b"/>
-            <a:pathLst>
-              <a:path w="120000" h="120000" extrusionOk="0">
-                <a:moveTo>
-                  <a:pt x="0" y="0"/>
-                </a:moveTo>
-                <a:lnTo>
-                  <a:pt x="120000" y="0"/>
-                </a:lnTo>
-                <a:lnTo>
-                  <a:pt x="120000" y="120000"/>
-                </a:lnTo>
-                <a:lnTo>
-                  <a:pt x="0" y="120000"/>
-                </a:lnTo>
-                <a:close/>
-              </a:path>
-            </a:pathLst>
-          </a:custGeom>
-          <a:noFill/>
-          <a:ln w="12700" cap="flat" cmpd="sng">
-            <a:solidFill>
-              <a:srgbClr val="000000"/>
-            </a:solidFill>
-            <a:prstDash val="solid"/>
-            <a:round/>
-            <a:headEnd type="none" w="sm" len="sm"/>
-            <a:tailEnd type="none" w="sm" len="sm"/>
-          </a:ln>
-        </p:spPr>
-      </p:sp>
-      <p:sp>
-        <p:nvSpPr>
-          <p:cNvPr id="235" name="Google Shape;235;p6:notes"/>
-          <p:cNvSpPr txBox="1">
-            <a:spLocks noGrp="1"/>
-          </p:cNvSpPr>
-          <p:nvPr>
-            <p:ph type="body" idx="1"/>
-          </p:nvPr>
-        </p:nvSpPr>
-        <p:spPr>
-          <a:xfrm>
-            <a:off x="685800" y="4400550"/>
-            <a:ext cx="5486400" cy="3600600"/>
-          </a:xfrm>
-          <a:prstGeom prst="rect">
-            <a:avLst/>
-          </a:prstGeom>
-          <a:noFill/>
-          <a:ln>
-            <a:noFill/>
-          </a:ln>
-        </p:spPr>
-        <p:txBody>
-          <a:bodyPr spcFirstLastPara="1" wrap="square" lIns="91425" tIns="45700" rIns="91425" bIns="45700" anchor="t" anchorCtr="0">
-            <a:noAutofit/>
-          </a:bodyPr>
-          <a:lstStyle/>
-          <a:p>
-            <a:pPr marL="0" lvl="0" indent="0" algn="l" rtl="0">
-              <a:lnSpc>
-                <a:spcPct val="100000"/>
-              </a:lnSpc>
-              <a:spcBef>
-                <a:spcPts val="0"/>
-              </a:spcBef>
-              <a:spcAft>
-                <a:spcPts val="0"/>
-              </a:spcAft>
-              <a:buSzPts val="1400"/>
-              <a:buNone/>
-            </a:pPr>
-            <a:r>
-              <a:rPr lang="de"/>
-              <a:t>20 minutes </a:t>
-            </a:r>
-            <a:endParaRPr/>
-          </a:p>
-          <a:p>
-            <a:pPr marL="0" lvl="0" indent="0" algn="l" rtl="0">
-              <a:lnSpc>
-                <a:spcPct val="100000"/>
-              </a:lnSpc>
-              <a:spcBef>
-                <a:spcPts val="0"/>
-              </a:spcBef>
-              <a:spcAft>
-                <a:spcPts val="0"/>
-              </a:spcAft>
-              <a:buSzPts val="1400"/>
-              <a:buNone/>
-            </a:pPr>
-            <a:endParaRPr/>
-          </a:p>
-          <a:p>
-            <a:pPr marL="0" lvl="0" indent="0" algn="l" rtl="0">
-              <a:lnSpc>
-                <a:spcPct val="100000"/>
-              </a:lnSpc>
-              <a:spcBef>
-                <a:spcPts val="0"/>
-              </a:spcBef>
-              <a:spcAft>
-                <a:spcPts val="0"/>
-              </a:spcAft>
-              <a:buSzPts val="1400"/>
-              <a:buNone/>
-            </a:pPr>
-            <a:r>
-              <a:rPr lang="de"/>
-              <a:t>Remember, when you are done your first draft. YOU ARE NOT DONE.  COUNT YOUR WORDS, if you are over 20 or under 3 in any line of dialogue you must edit your own text to make it fit or expand on the world lore or to make the character speaking sound unique. </a:t>
-            </a:r>
-            <a:endParaRPr/>
-          </a:p>
-        </p:txBody>
-      </p:sp>
-    </p:spTree>
-  </p:cSld>
-  <p:clrMapOvr>
-    <a:masterClrMapping/>
-  </p:clrMapOvr>
-</p:notes>
-</file>
-
-<file path=ppt/notesSlides/notesSlide6.xml><?xml version="1.0" encoding="utf-8"?>
 <p:notes xmlns:a="http://schemas.openxmlformats.org/drawingml/2006/main" xmlns:r="http://schemas.openxmlformats.org/officeDocument/2006/relationships" xmlns:p="http://schemas.openxmlformats.org/presentationml/2006/main" showMasterSp="0" showMasterPhAnim="0">
   <p:cSld>
     <p:spTree>
@@ -24663,25 +24500,17 @@
           </a:bodyPr>
           <a:lstStyle/>
           <a:p>
-            <a:pPr marL="0" lvl="0" indent="0" algn="l" rtl="0">
+            <a:pPr lvl="0">
               <a:lnSpc>
                 <a:spcPct val="115000"/>
               </a:lnSpc>
-              <a:spcBef>
-                <a:spcPts val="0"/>
-              </a:spcBef>
-              <a:spcAft>
-                <a:spcPts val="0"/>
-              </a:spcAft>
               <a:buClr>
                 <a:schemeClr val="lt1"/>
               </a:buClr>
               <a:buSzPts val="1800"/>
-              <a:buFont typeface="Montserrat ExtraBold"/>
-              <a:buNone/>
             </a:pPr>
             <a:r>
-              <a:rPr lang="de" sz="1800">
+              <a:rPr lang="de-DE" sz="1800" dirty="0" err="1">
                 <a:solidFill>
                   <a:schemeClr val="lt1"/>
                 </a:solidFill>
@@ -24690,38 +24519,33 @@
                 <a:cs typeface="Montserrat ExtraBold"/>
                 <a:sym typeface="Montserrat ExtraBold"/>
               </a:rPr>
-              <a:t>Character Name</a:t>
+              <a:t>Kyoufu</a:t>
             </a:r>
-            <a:endParaRPr sz="1100" b="0" i="0" u="none" strike="noStrike" cap="none">
-              <a:solidFill>
-                <a:srgbClr val="000000"/>
-              </a:solidFill>
-              <a:latin typeface="Arial"/>
-              <a:ea typeface="Arial"/>
-              <a:cs typeface="Arial"/>
-              <a:sym typeface="Arial"/>
-            </a:endParaRPr>
+            <a:r>
+              <a:rPr lang="de-DE" sz="1800" dirty="0">
+                <a:solidFill>
+                  <a:schemeClr val="lt1"/>
+                </a:solidFill>
+                <a:latin typeface="Montserrat ExtraBold"/>
+                <a:ea typeface="Montserrat ExtraBold"/>
+                <a:cs typeface="Montserrat ExtraBold"/>
+                <a:sym typeface="Montserrat ExtraBold"/>
+              </a:rPr>
+              <a:t> </a:t>
+            </a:r>
           </a:p>
           <a:p>
-            <a:pPr marL="0" marR="0" lvl="0" indent="0" algn="l" rtl="0">
+            <a:pPr lvl="0">
               <a:lnSpc>
                 <a:spcPct val="115000"/>
               </a:lnSpc>
-              <a:spcBef>
-                <a:spcPts val="0"/>
-              </a:spcBef>
-              <a:spcAft>
-                <a:spcPts val="0"/>
-              </a:spcAft>
-              <a:buClr>
-                <a:srgbClr val="FFB951"/>
+              <a:buClr>
+                <a:schemeClr val="lt1"/>
               </a:buClr>
               <a:buSzPts val="1800"/>
-              <a:buFont typeface="Montserrat ExtraBold"/>
-              <a:buNone/>
             </a:pPr>
             <a:r>
-              <a:rPr lang="de" sz="1800" b="0" i="0" u="none" strike="noStrike" cap="none">
+              <a:rPr lang="de" sz="1800" b="0" i="0" u="none" strike="noStrike" cap="none" dirty="0">
                 <a:solidFill>
                   <a:srgbClr val="FFB951"/>
                 </a:solidFill>
@@ -24732,7 +24556,7 @@
               </a:rPr>
               <a:t>Character Checklist</a:t>
             </a:r>
-            <a:endParaRPr sz="1100" b="0" i="0" u="none" strike="noStrike" cap="none">
+            <a:endParaRPr sz="1100" b="0" i="0" u="none" strike="noStrike" cap="none" dirty="0">
               <a:solidFill>
                 <a:srgbClr val="000000"/>
               </a:solidFill>
@@ -24748,18 +24572,23 @@
         <p:nvGraphicFramePr>
           <p:cNvPr id="169" name="Google Shape;169;g3b636e5de4b_0_32"/>
           <p:cNvGraphicFramePr/>
-          <p:nvPr/>
+          <p:nvPr>
+            <p:extLst>
+              <p:ext uri="{D42A27DB-BD31-4B8C-83A1-F6EECF244321}">
+                <p14:modId xmlns:p14="http://schemas.microsoft.com/office/powerpoint/2010/main" val="275277565"/>
+              </p:ext>
+            </p:extLst>
+          </p:nvPr>
         </p:nvGraphicFramePr>
         <p:xfrm>
           <a:off x="21850" y="851289"/>
-          <a:ext cx="9080600" cy="4974750"/>
+          <a:ext cx="9080600" cy="5864530"/>
         </p:xfrm>
         <a:graphic>
           <a:graphicData uri="http://schemas.openxmlformats.org/drawingml/2006/table">
             <a:tbl>
               <a:tblPr bandCol="1">
-                <a:noFill/>
-                <a:tableStyleId>{692E3274-4D5C-44BF-BB08-FA6336CB3DAF}</a:tableStyleId>
+                <a:tableStyleId>{284E427A-3D55-4303-BF80-6455036E1DE7}</a:tableStyleId>
               </a:tblPr>
               <a:tblGrid>
                 <a:gridCol w="2270150">
@@ -24816,9 +24645,7 @@
                       <a:endParaRPr/>
                     </a:p>
                   </a:txBody>
-                  <a:tcPr marL="91450" marR="91450" marT="45725" marB="45725">
-                    <a:noFill/>
-                  </a:tcPr>
+                  <a:tcPr marL="91450" marR="91450" marT="45725" marB="45725"/>
                 </a:tc>
                 <a:tc>
                   <a:txBody>
@@ -24835,15 +24662,13 @@
                         <a:buNone/>
                       </a:pPr>
                       <a:r>
-                        <a:rPr lang="de"/>
-                        <a:t>Why do they do, what they do</a:t>
+                        <a:rPr lang="de" dirty="0"/>
+                        <a:t>Versucht denen zu helfen die sich selbst nicht helfen können. Da er es in seinem Leben nicht getan hat</a:t>
                       </a:r>
-                      <a:endParaRPr/>
+                      <a:endParaRPr dirty="0"/>
                     </a:p>
                   </a:txBody>
-                  <a:tcPr marL="91450" marR="91450" marT="45725" marB="45725">
-                    <a:noFill/>
-                  </a:tcPr>
+                  <a:tcPr marL="91450" marR="91450" marT="45725" marB="45725"/>
                 </a:tc>
                 <a:tc>
                   <a:txBody>
@@ -24869,9 +24694,7 @@
                       <a:endParaRPr sz="1400" b="1" u="none" strike="noStrike" cap="none"/>
                     </a:p>
                   </a:txBody>
-                  <a:tcPr marL="91450" marR="91450" marT="45725" marB="45725">
-                    <a:noFill/>
-                  </a:tcPr>
+                  <a:tcPr marL="91450" marR="91450" marT="45725" marB="45725"/>
                 </a:tc>
                 <a:tc>
                   <a:txBody>
@@ -24888,15 +24711,13 @@
                         <a:buNone/>
                       </a:pPr>
                       <a:r>
-                        <a:rPr lang="de"/>
-                        <a:t>What makes them different</a:t>
+                        <a:rPr lang="de" dirty="0"/>
+                        <a:t>Er fängt öfter an in der Luft zu starren</a:t>
                       </a:r>
-                      <a:endParaRPr/>
+                      <a:endParaRPr dirty="0"/>
                     </a:p>
                   </a:txBody>
-                  <a:tcPr marL="91450" marR="91450" marT="45725" marB="45725">
-                    <a:noFill/>
-                  </a:tcPr>
+                  <a:tcPr marL="91450" marR="91450" marT="45725" marB="45725"/>
                 </a:tc>
                 <a:extLst>
                   <a:ext uri="{0D108BD9-81ED-4DB2-BD59-A6C34878D82A}">
@@ -24923,15 +24744,13 @@
                         <a:buNone/>
                       </a:pPr>
                       <a:r>
-                        <a:rPr lang="de" sz="1400" b="1" u="none" strike="noStrike" cap="none"/>
+                        <a:rPr lang="de" sz="1400" b="1" u="none" strike="noStrike" cap="none" dirty="0"/>
                         <a:t>Flaw</a:t>
                       </a:r>
-                      <a:endParaRPr sz="1400" b="1" u="none" strike="noStrike" cap="none"/>
+                      <a:endParaRPr sz="1400" b="1" u="none" strike="noStrike" cap="none" dirty="0"/>
                     </a:p>
                   </a:txBody>
-                  <a:tcPr marL="91450" marR="91450" marT="45725" marB="45725">
-                    <a:noFill/>
-                  </a:tcPr>
+                  <a:tcPr marL="91450" marR="91450" marT="45725" marB="45725"/>
                 </a:tc>
                 <a:tc>
                   <a:txBody>
@@ -24948,15 +24767,13 @@
                         <a:buNone/>
                       </a:pPr>
                       <a:r>
-                        <a:rPr lang="de"/>
-                        <a:t>something negative about them </a:t>
+                        <a:rPr lang="de" dirty="0"/>
+                        <a:t>Wenn ihm eine Aufgabe zu groß wird versucht er sich aus dieser Rauszureden</a:t>
                       </a:r>
-                      <a:endParaRPr/>
+                      <a:endParaRPr dirty="0"/>
                     </a:p>
                   </a:txBody>
-                  <a:tcPr marL="91450" marR="91450" marT="45725" marB="45725">
-                    <a:noFill/>
-                  </a:tcPr>
+                  <a:tcPr marL="91450" marR="91450" marT="45725" marB="45725"/>
                 </a:tc>
                 <a:tc>
                   <a:txBody>
@@ -24982,9 +24799,7 @@
                       <a:endParaRPr/>
                     </a:p>
                   </a:txBody>
-                  <a:tcPr marL="91450" marR="91450" marT="45725" marB="45725">
-                    <a:noFill/>
-                  </a:tcPr>
+                  <a:tcPr marL="91450" marR="91450" marT="45725" marB="45725"/>
                 </a:tc>
                 <a:tc>
                   <a:txBody>
@@ -25001,15 +24816,13 @@
                         <a:buNone/>
                       </a:pPr>
                       <a:r>
-                        <a:rPr lang="de"/>
-                        <a:t>Something mysterious about them (can be silly) </a:t>
+                        <a:rPr lang="de" dirty="0"/>
+                        <a:t>Er hat im Krieg immer versucht zu helfen ist aber bei großen Kämpfen abgehauen</a:t>
                       </a:r>
-                      <a:endParaRPr/>
+                      <a:endParaRPr dirty="0"/>
                     </a:p>
                   </a:txBody>
-                  <a:tcPr marL="91450" marR="91450" marT="45725" marB="45725">
-                    <a:noFill/>
-                  </a:tcPr>
+                  <a:tcPr marL="91450" marR="91450" marT="45725" marB="45725"/>
                 </a:tc>
                 <a:extLst>
                   <a:ext uri="{0D108BD9-81ED-4DB2-BD59-A6C34878D82A}">
@@ -25042,9 +24855,7 @@
                       <a:endParaRPr sz="1400" b="1" u="none" strike="noStrike" cap="none"/>
                     </a:p>
                   </a:txBody>
-                  <a:tcPr marL="91450" marR="91450" marT="45725" marB="45725">
-                    <a:noFill/>
-                  </a:tcPr>
+                  <a:tcPr marL="91450" marR="91450" marT="45725" marB="45725"/>
                 </a:tc>
                 <a:tc>
                   <a:txBody>
@@ -25061,15 +24872,13 @@
                         <a:buNone/>
                       </a:pPr>
                       <a:r>
-                        <a:rPr lang="de"/>
-                        <a:t>Which group do they belong too </a:t>
+                        <a:rPr lang="de" dirty="0"/>
+                        <a:t>Sleep Department</a:t>
                       </a:r>
-                      <a:endParaRPr/>
+                      <a:endParaRPr dirty="0"/>
                     </a:p>
                   </a:txBody>
-                  <a:tcPr marL="91450" marR="91450" marT="45725" marB="45725">
-                    <a:noFill/>
-                  </a:tcPr>
+                  <a:tcPr marL="91450" marR="91450" marT="45725" marB="45725"/>
                 </a:tc>
                 <a:tc>
                   <a:txBody>
@@ -25095,9 +24904,7 @@
                       <a:endParaRPr sz="1400" b="1" u="none" strike="noStrike" cap="none"/>
                     </a:p>
                   </a:txBody>
-                  <a:tcPr marL="91450" marR="91450" marT="45725" marB="45725">
-                    <a:noFill/>
-                  </a:tcPr>
+                  <a:tcPr marL="91450" marR="91450" marT="45725" marB="45725"/>
                 </a:tc>
                 <a:tc>
                   <a:txBody>
@@ -25114,15 +24921,13 @@
                         <a:buNone/>
                       </a:pPr>
                       <a:r>
-                        <a:rPr lang="de"/>
-                        <a:t>How does he present himself </a:t>
+                        <a:rPr lang="de" dirty="0"/>
+                        <a:t>Versucht Mutig zu wirken schreckt jedoch häufig zusammen</a:t>
                       </a:r>
-                      <a:endParaRPr/>
+                      <a:endParaRPr dirty="0"/>
                     </a:p>
                   </a:txBody>
-                  <a:tcPr marL="91450" marR="91450" marT="45725" marB="45725">
-                    <a:noFill/>
-                  </a:tcPr>
+                  <a:tcPr marL="91450" marR="91450" marT="45725" marB="45725"/>
                 </a:tc>
                 <a:extLst>
                   <a:ext uri="{0D108BD9-81ED-4DB2-BD59-A6C34878D82A}">
@@ -25155,9 +24960,7 @@
                       <a:endParaRPr/>
                     </a:p>
                   </a:txBody>
-                  <a:tcPr marL="91450" marR="91450" marT="45725" marB="45725">
-                    <a:noFill/>
-                  </a:tcPr>
+                  <a:tcPr marL="91450" marR="91450" marT="45725" marB="45725"/>
                 </a:tc>
                 <a:tc>
                   <a:txBody>
@@ -25174,15 +24977,13 @@
                         <a:buNone/>
                       </a:pPr>
                       <a:r>
-                        <a:rPr lang="de"/>
-                        <a:t>In what do they believe </a:t>
+                        <a:rPr lang="de" dirty="0"/>
+                        <a:t>Angst ist der größte Segen und der größte Fluch der Welt. Du solltest dich ihr unterwerfen. </a:t>
                       </a:r>
-                      <a:endParaRPr/>
+                      <a:endParaRPr dirty="0"/>
                     </a:p>
                   </a:txBody>
-                  <a:tcPr marL="91450" marR="91450" marT="45725" marB="45725">
-                    <a:noFill/>
-                  </a:tcPr>
+                  <a:tcPr marL="91450" marR="91450" marT="45725" marB="45725"/>
                 </a:tc>
                 <a:tc>
                   <a:txBody>
@@ -25208,9 +25009,7 @@
                       <a:endParaRPr sz="1400" b="1" u="none" strike="noStrike" cap="none"/>
                     </a:p>
                   </a:txBody>
-                  <a:tcPr marL="91450" marR="91450" marT="45725" marB="45725">
-                    <a:noFill/>
-                  </a:tcPr>
+                  <a:tcPr marL="91450" marR="91450" marT="45725" marB="45725"/>
                 </a:tc>
                 <a:tc>
                   <a:txBody>
@@ -25227,15 +25026,13 @@
                         <a:buNone/>
                       </a:pPr>
                       <a:r>
-                        <a:rPr lang="de"/>
-                        <a:t>What do they prefer</a:t>
+                        <a:rPr lang="de" dirty="0"/>
+                        <a:t>Sicherheit</a:t>
                       </a:r>
-                      <a:endParaRPr/>
+                      <a:endParaRPr dirty="0"/>
                     </a:p>
                   </a:txBody>
-                  <a:tcPr marL="91450" marR="91450" marT="45725" marB="45725">
-                    <a:noFill/>
-                  </a:tcPr>
+                  <a:tcPr marL="91450" marR="91450" marT="45725" marB="45725"/>
                 </a:tc>
                 <a:extLst>
                   <a:ext uri="{0D108BD9-81ED-4DB2-BD59-A6C34878D82A}">
@@ -25268,9 +25065,7 @@
                       <a:endParaRPr/>
                     </a:p>
                   </a:txBody>
-                  <a:tcPr marL="91450" marR="91450" marT="45725" marB="45725">
-                    <a:noFill/>
-                  </a:tcPr>
+                  <a:tcPr marL="91450" marR="91450" marT="45725" marB="45725"/>
                 </a:tc>
                 <a:tc>
                   <a:txBody>
@@ -25287,15 +25082,13 @@
                         <a:buNone/>
                       </a:pPr>
                       <a:r>
-                        <a:rPr lang="de"/>
-                        <a:t>How does he enrich the world</a:t>
+                        <a:rPr lang="de" dirty="0"/>
+                        <a:t>Er kann Menschen durch gezielte Angst wieder Demütig werden lassen, oder zurück in die Realität holen</a:t>
                       </a:r>
-                      <a:endParaRPr/>
+                      <a:endParaRPr dirty="0"/>
                     </a:p>
                   </a:txBody>
-                  <a:tcPr marL="91450" marR="91450" marT="45725" marB="45725">
-                    <a:noFill/>
-                  </a:tcPr>
+                  <a:tcPr marL="91450" marR="91450" marT="45725" marB="45725"/>
                 </a:tc>
                 <a:tc>
                   <a:txBody>
@@ -25321,9 +25114,7 @@
                       <a:endParaRPr sz="1400" b="1" u="none" strike="noStrike" cap="none"/>
                     </a:p>
                   </a:txBody>
-                  <a:tcPr marL="91450" marR="91450" marT="45725" marB="45725">
-                    <a:noFill/>
-                  </a:tcPr>
+                  <a:tcPr marL="91450" marR="91450" marT="45725" marB="45725"/>
                 </a:tc>
                 <a:tc>
                   <a:txBody>
@@ -25340,15 +25131,13 @@
                         <a:buNone/>
                       </a:pPr>
                       <a:r>
-                        <a:rPr lang="de"/>
-                        <a:t>The most hurtful situation </a:t>
+                        <a:rPr lang="de" dirty="0"/>
+                        <a:t>Als er nachdem er vor einem Kampf davon gelaufen ist in die Maske verwandelt wurde</a:t>
                       </a:r>
-                      <a:endParaRPr/>
+                      <a:endParaRPr dirty="0"/>
                     </a:p>
                   </a:txBody>
-                  <a:tcPr marL="91450" marR="91450" marT="45725" marB="45725">
-                    <a:noFill/>
-                  </a:tcPr>
+                  <a:tcPr marL="91450" marR="91450" marT="45725" marB="45725"/>
                 </a:tc>
                 <a:extLst>
                   <a:ext uri="{0D108BD9-81ED-4DB2-BD59-A6C34878D82A}">
@@ -25381,9 +25170,7 @@
                       <a:endParaRPr sz="1400" b="1" u="none" strike="noStrike" cap="none"/>
                     </a:p>
                   </a:txBody>
-                  <a:tcPr marL="91450" marR="91450" marT="45725" marB="45725">
-                    <a:noFill/>
-                  </a:tcPr>
+                  <a:tcPr marL="91450" marR="91450" marT="45725" marB="45725"/>
                 </a:tc>
                 <a:tc>
                   <a:txBody>
@@ -25403,15 +25190,13 @@
                         <a:buNone/>
                       </a:pPr>
                       <a:r>
-                        <a:rPr lang="de" sz="1100"/>
-                        <a:t>Give them a cool but very dumb quirk</a:t>
+                        <a:rPr lang="de" sz="1100" u="none" strike="noStrike" cap="none" dirty="0"/>
+                        <a:t>Kennt zu jeder situation ein passendes Sprichwort</a:t>
                       </a:r>
-                      <a:endParaRPr sz="1100" u="none" strike="noStrike" cap="none"/>
+                      <a:endParaRPr sz="1100" u="none" strike="noStrike" cap="none" dirty="0"/>
                     </a:p>
                   </a:txBody>
-                  <a:tcPr marL="91450" marR="91450" marT="45725" marB="45725">
-                    <a:noFill/>
-                  </a:tcPr>
+                  <a:tcPr marL="91450" marR="91450" marT="45725" marB="45725"/>
                 </a:tc>
                 <a:tc>
                   <a:txBody>
@@ -25433,9 +25218,7 @@
                       <a:endParaRPr sz="1400" b="1" u="none" strike="noStrike" cap="none"/>
                     </a:p>
                   </a:txBody>
-                  <a:tcPr marL="91450" marR="91450" marT="45725" marB="45725">
-                    <a:noFill/>
-                  </a:tcPr>
+                  <a:tcPr marL="91450" marR="91450" marT="45725" marB="45725"/>
                 </a:tc>
                 <a:tc>
                   <a:txBody>
@@ -25454,12 +25237,10 @@
                         </a:spcAft>
                         <a:buNone/>
                       </a:pPr>
-                      <a:endParaRPr sz="1100" u="none" strike="noStrike" cap="none"/>
+                      <a:endParaRPr sz="1100" u="none" strike="noStrike" cap="none" dirty="0"/>
                     </a:p>
                   </a:txBody>
-                  <a:tcPr marL="91450" marR="91450" marT="45725" marB="45725">
-                    <a:noFill/>
-                  </a:tcPr>
+                  <a:tcPr marL="91450" marR="91450" marT="45725" marB="45725"/>
                 </a:tc>
                 <a:extLst>
                   <a:ext uri="{0D108BD9-81ED-4DB2-BD59-A6C34878D82A}">
@@ -25505,7 +25286,7 @@
         <p:spPr>
           <a:xfrm>
             <a:off x="22124" y="703635"/>
-            <a:ext cx="9122100" cy="3879000"/>
+            <a:ext cx="9122100" cy="4441186"/>
           </a:xfrm>
           <a:prstGeom prst="rect">
             <a:avLst/>
@@ -25539,7 +25320,7 @@
               <a:buNone/>
             </a:pPr>
             <a:r>
-              <a:rPr lang="de" sz="1800" b="1" i="0" u="none" strike="noStrike" cap="none">
+              <a:rPr lang="de" sz="1800" b="1" i="0" u="none" strike="noStrike" cap="none" dirty="0">
                 <a:solidFill>
                   <a:srgbClr val="FF0000"/>
                 </a:solidFill>
@@ -25550,7 +25331,60 @@
               </a:rPr>
               <a:t>Name: </a:t>
             </a:r>
-            <a:endParaRPr sz="1100" b="0" i="0" u="none" strike="noStrike" cap="none">
+            <a:r>
+              <a:rPr lang="de" sz="1800" b="1" dirty="0">
+                <a:solidFill>
+                  <a:schemeClr val="tx1"/>
+                </a:solidFill>
+                <a:latin typeface="Calibri"/>
+                <a:ea typeface="Calibri"/>
+                <a:cs typeface="Calibri"/>
+                <a:sym typeface="Calibri"/>
+              </a:rPr>
+              <a:t>Kyofu</a:t>
+            </a:r>
+            <a:endParaRPr sz="1100" b="0" i="0" u="none" strike="noStrike" cap="none" dirty="0">
+              <a:solidFill>
+                <a:schemeClr val="dk1"/>
+              </a:solidFill>
+              <a:latin typeface="Calibri"/>
+              <a:ea typeface="Calibri"/>
+              <a:cs typeface="Calibri"/>
+              <a:sym typeface="Calibri"/>
+            </a:endParaRPr>
+          </a:p>
+          <a:p>
+            <a:pPr lvl="0">
+              <a:lnSpc>
+                <a:spcPct val="115000"/>
+              </a:lnSpc>
+              <a:buSzPts val="1800"/>
+            </a:pPr>
+            <a:r>
+              <a:rPr lang="de" sz="1800" b="1" i="0" u="none" strike="noStrike" cap="none" dirty="0">
+                <a:solidFill>
+                  <a:srgbClr val="FF0000"/>
+                </a:solidFill>
+                <a:latin typeface="Calibri"/>
+                <a:ea typeface="Calibri"/>
+                <a:cs typeface="Calibri"/>
+                <a:sym typeface="Calibri"/>
+              </a:rPr>
+              <a:t>Gender: </a:t>
+            </a:r>
+            <a:r>
+              <a:rPr lang="de" sz="1800" b="1" dirty="0">
+                <a:solidFill>
+                  <a:schemeClr val="tx1"/>
+                </a:solidFill>
+                <a:latin typeface="Calibri"/>
+                <a:ea typeface="Calibri"/>
+                <a:cs typeface="Calibri"/>
+                <a:sym typeface="Calibri"/>
+              </a:rPr>
+              <a:t>Male</a:t>
+            </a:r>
+            <a:endParaRPr sz="1800" b="1" i="0" u="none" strike="noStrike" cap="none" dirty="0">
               <a:solidFill>
                 <a:schemeClr val="dk1"/>
               </a:solidFill>
@@ -25579,7 +25413,7 @@
               <a:buNone/>
             </a:pPr>
             <a:r>
-              <a:rPr lang="de" sz="1800" b="1" i="0" u="none" strike="noStrike" cap="none">
+              <a:rPr lang="de" sz="1800" b="1" i="0" u="none" strike="noStrike" cap="none" dirty="0">
                 <a:solidFill>
                   <a:srgbClr val="FF0000"/>
                 </a:solidFill>
@@ -25588,9 +25422,21 @@
                 <a:cs typeface="Calibri"/>
                 <a:sym typeface="Calibri"/>
               </a:rPr>
-              <a:t>Gender: </a:t>
+              <a:t>Age: </a:t>
             </a:r>
-            <a:endParaRPr sz="1800" b="1" i="0" u="none" strike="noStrike" cap="none">
+            <a:r>
+              <a:rPr lang="de" sz="1800" b="1" i="0" u="none" strike="noStrike" cap="none" dirty="0">
+                <a:solidFill>
+                  <a:schemeClr val="tx1"/>
+                </a:solidFill>
+                <a:latin typeface="Calibri"/>
+                <a:ea typeface="Calibri"/>
+                <a:cs typeface="Calibri"/>
+                <a:sym typeface="Calibri"/>
+              </a:rPr>
+              <a:t>Over 500 years</a:t>
+            </a:r>
+            <a:endParaRPr sz="1800" b="1" i="0" u="none" strike="noStrike" cap="none" dirty="0">
               <a:solidFill>
                 <a:schemeClr val="dk1"/>
               </a:solidFill>
@@ -25619,7 +25465,7 @@
               <a:buNone/>
             </a:pPr>
             <a:r>
-              <a:rPr lang="de" sz="1800" b="1" i="0" u="none" strike="noStrike" cap="none">
+              <a:rPr lang="de" sz="1800" b="1" i="0" u="none" strike="noStrike" cap="none" dirty="0">
                 <a:solidFill>
                   <a:srgbClr val="FF0000"/>
                 </a:solidFill>
@@ -25628,9 +25474,21 @@
                 <a:cs typeface="Calibri"/>
                 <a:sym typeface="Calibri"/>
               </a:rPr>
-              <a:t>Age: </a:t>
+              <a:t>Personality: </a:t>
             </a:r>
-            <a:endParaRPr sz="1800" b="1" i="0" u="none" strike="noStrike" cap="none">
+            <a:r>
+              <a:rPr lang="de" sz="1800" b="1" i="0" u="none" strike="noStrike" cap="none" dirty="0">
+                <a:solidFill>
+                  <a:schemeClr val="tx1"/>
+                </a:solidFill>
+                <a:latin typeface="Calibri"/>
+                <a:ea typeface="Calibri"/>
+                <a:cs typeface="Calibri"/>
+                <a:sym typeface="Calibri"/>
+              </a:rPr>
+              <a:t>The Innocent, The Everyman</a:t>
+            </a:r>
+            <a:endParaRPr sz="1800" b="1" i="0" u="none" strike="noStrike" cap="none" dirty="0">
               <a:solidFill>
                 <a:schemeClr val="dk1"/>
               </a:solidFill>
@@ -25652,14 +25510,14 @@
                 <a:spcPts val="0"/>
               </a:spcAft>
               <a:buClr>
-                <a:srgbClr val="000000"/>
+                <a:schemeClr val="dk1"/>
               </a:buClr>
               <a:buSzPts val="1800"/>
               <a:buFont typeface="Arial"/>
               <a:buNone/>
             </a:pPr>
             <a:r>
-              <a:rPr lang="de" sz="1800" b="1" i="0" u="none" strike="noStrike" cap="none">
+              <a:rPr lang="de" sz="1800" b="1" i="0" u="none" strike="noStrike" cap="none" dirty="0">
                 <a:solidFill>
                   <a:srgbClr val="FF0000"/>
                 </a:solidFill>
@@ -25668,9 +25526,21 @@
                 <a:cs typeface="Calibri"/>
                 <a:sym typeface="Calibri"/>
               </a:rPr>
-              <a:t>Personality: </a:t>
+              <a:t>Alignment: </a:t>
             </a:r>
-            <a:endParaRPr sz="1800" b="1" i="0" u="none" strike="noStrike" cap="none">
+            <a:r>
+              <a:rPr lang="de" sz="1800" b="1" dirty="0">
+                <a:solidFill>
+                  <a:schemeClr val="tx1"/>
+                </a:solidFill>
+                <a:latin typeface="Calibri"/>
+                <a:ea typeface="Calibri"/>
+                <a:cs typeface="Calibri"/>
+                <a:sym typeface="Calibri"/>
+              </a:rPr>
+              <a:t>lawfull evil</a:t>
+            </a:r>
+            <a:endParaRPr sz="1800" b="1" i="0" u="none" strike="noStrike" cap="none" dirty="0">
               <a:solidFill>
                 <a:schemeClr val="dk1"/>
               </a:solidFill>
@@ -25699,47 +25569,7 @@
               <a:buNone/>
             </a:pPr>
             <a:r>
-              <a:rPr lang="de" sz="1800" b="1" i="0" u="none" strike="noStrike" cap="none">
-                <a:solidFill>
-                  <a:srgbClr val="FF0000"/>
-                </a:solidFill>
-                <a:latin typeface="Calibri"/>
-                <a:ea typeface="Calibri"/>
-                <a:cs typeface="Calibri"/>
-                <a:sym typeface="Calibri"/>
-              </a:rPr>
-              <a:t>Alignment: </a:t>
-            </a:r>
-            <a:endParaRPr sz="1800" b="1" i="0" u="none" strike="noStrike" cap="none">
-              <a:solidFill>
-                <a:schemeClr val="dk1"/>
-              </a:solidFill>
-              <a:latin typeface="Calibri"/>
-              <a:ea typeface="Calibri"/>
-              <a:cs typeface="Calibri"/>
-              <a:sym typeface="Calibri"/>
-            </a:endParaRPr>
-          </a:p>
-          <a:p>
-            <a:pPr marL="0" marR="0" lvl="0" indent="0" algn="l" rtl="0">
-              <a:lnSpc>
-                <a:spcPct val="115000"/>
-              </a:lnSpc>
-              <a:spcBef>
-                <a:spcPts val="0"/>
-              </a:spcBef>
-              <a:spcAft>
-                <a:spcPts val="0"/>
-              </a:spcAft>
-              <a:buClr>
-                <a:schemeClr val="dk1"/>
-              </a:buClr>
-              <a:buSzPts val="1800"/>
-              <a:buFont typeface="Arial"/>
-              <a:buNone/>
-            </a:pPr>
-            <a:r>
-              <a:rPr lang="de" sz="1800" b="1" i="0" u="none" strike="noStrike" cap="none">
+              <a:rPr lang="de" sz="1800" b="1" i="0" u="none" strike="noStrike" cap="none" dirty="0">
                 <a:solidFill>
                   <a:srgbClr val="FF0000"/>
                 </a:solidFill>
@@ -25750,7 +25580,19 @@
               </a:rPr>
               <a:t>Occupation: </a:t>
             </a:r>
-            <a:endParaRPr sz="1800" b="1" i="0" u="none" strike="noStrike" cap="none">
+            <a:r>
+              <a:rPr lang="de" sz="1800" b="1" i="0" u="none" strike="noStrike" cap="none" dirty="0">
+                <a:solidFill>
+                  <a:schemeClr val="tx1"/>
+                </a:solidFill>
+                <a:latin typeface="Calibri"/>
+                <a:ea typeface="Calibri"/>
+                <a:cs typeface="Calibri"/>
+                <a:sym typeface="Calibri"/>
+              </a:rPr>
+              <a:t>Medizin</a:t>
+            </a:r>
+            <a:endParaRPr sz="1800" b="1" i="0" u="none" strike="noStrike" cap="none" dirty="0">
               <a:solidFill>
                 <a:srgbClr val="FF0000"/>
               </a:solidFill>
@@ -25778,7 +25620,7 @@
               <a:buFont typeface="Arial"/>
               <a:buNone/>
             </a:pPr>
-            <a:endParaRPr sz="1800" b="1" i="0" u="none" strike="noStrike" cap="none">
+            <a:endParaRPr sz="1800" b="1" i="0" u="none" strike="noStrike" cap="none" dirty="0">
               <a:solidFill>
                 <a:srgbClr val="FF0000"/>
               </a:solidFill>
@@ -25807,7 +25649,7 @@
               <a:buNone/>
             </a:pPr>
             <a:r>
-              <a:rPr lang="de" sz="1800" b="0" i="0" u="none" strike="noStrike" cap="none">
+              <a:rPr lang="de" sz="1800" b="0" i="0" u="none" strike="noStrike" cap="none" dirty="0">
                 <a:solidFill>
                   <a:srgbClr val="FF0000"/>
                 </a:solidFill>
@@ -25818,7 +25660,7 @@
               </a:rPr>
               <a:t> </a:t>
             </a:r>
-            <a:endParaRPr sz="1800" b="0" i="0" u="none" strike="noStrike" cap="none">
+            <a:endParaRPr sz="1800" b="0" i="0" u="none" strike="noStrike" cap="none" dirty="0">
               <a:solidFill>
                 <a:srgbClr val="FF0000"/>
               </a:solidFill>
@@ -25846,7 +25688,7 @@
               <a:buFont typeface="Arial"/>
               <a:buNone/>
             </a:pPr>
-            <a:endParaRPr sz="1800" b="1" i="0" u="none" strike="noStrike" cap="none">
+            <a:endParaRPr sz="1800" b="1" i="0" u="none" strike="noStrike" cap="none" dirty="0">
               <a:solidFill>
                 <a:srgbClr val="FF0000"/>
               </a:solidFill>
@@ -25868,53 +25710,73 @@
                 <a:spcPts val="0"/>
               </a:spcAft>
               <a:buClr>
-                <a:schemeClr val="dk1"/>
-              </a:buClr>
-              <a:buSzPts val="800"/>
+                <a:srgbClr val="000000"/>
+              </a:buClr>
+              <a:buSzPts val="1800"/>
               <a:buFont typeface="Arial"/>
               <a:buNone/>
             </a:pPr>
             <a:r>
-              <a:rPr lang="de" sz="1800" b="1" i="0" u="none" strike="noStrike" cap="none">
-                <a:solidFill>
-                  <a:srgbClr val="FF0000"/>
-                </a:solidFill>
-                <a:latin typeface="Arial"/>
-                <a:ea typeface="Arial"/>
-                <a:cs typeface="Arial"/>
-                <a:sym typeface="Arial"/>
+              <a:rPr lang="de-DE" sz="1800" b="0" i="0" u="none" strike="noStrike" cap="none" dirty="0">
+                <a:solidFill>
+                  <a:srgbClr val="242424"/>
+                </a:solidFill>
+                <a:latin typeface="Calibri"/>
+                <a:ea typeface="Calibri"/>
+                <a:cs typeface="Calibri"/>
+                <a:sym typeface="Calibri"/>
               </a:rPr>
-              <a:t>Describe the past, the what and the now shortly</a:t>
+              <a:t>Nachdem </a:t>
             </a:r>
-            <a:endParaRPr sz="1800" b="1" i="0" u="none" strike="noStrike" cap="none">
-              <a:solidFill>
-                <a:srgbClr val="FF0000"/>
-              </a:solidFill>
-              <a:latin typeface="Arial"/>
-              <a:ea typeface="Arial"/>
-              <a:cs typeface="Arial"/>
-              <a:sym typeface="Arial"/>
-            </a:endParaRPr>
-          </a:p>
-          <a:p>
-            <a:pPr marL="0" marR="0" lvl="0" indent="0" algn="l" rtl="0">
-              <a:lnSpc>
-                <a:spcPct val="115000"/>
-              </a:lnSpc>
-              <a:spcBef>
-                <a:spcPts val="900"/>
-              </a:spcBef>
-              <a:spcAft>
-                <a:spcPts val="0"/>
-              </a:spcAft>
-              <a:buClr>
-                <a:srgbClr val="000000"/>
-              </a:buClr>
-              <a:buSzPts val="1800"/>
-              <a:buFont typeface="Arial"/>
-              <a:buNone/>
-            </a:pPr>
-            <a:endParaRPr sz="1800" b="0" i="0" u="none" strike="noStrike" cap="none">
+            <a:r>
+              <a:rPr lang="de-DE" sz="1800" b="0" i="0" u="none" strike="noStrike" cap="none" dirty="0" err="1">
+                <a:solidFill>
+                  <a:srgbClr val="242424"/>
+                </a:solidFill>
+                <a:latin typeface="Calibri"/>
+                <a:ea typeface="Calibri"/>
+                <a:cs typeface="Calibri"/>
+                <a:sym typeface="Calibri"/>
+              </a:rPr>
+              <a:t>Kyoufu</a:t>
+            </a:r>
+            <a:r>
+              <a:rPr lang="de-DE" sz="1800" b="0" i="0" u="none" strike="noStrike" cap="none" dirty="0">
+                <a:solidFill>
+                  <a:srgbClr val="242424"/>
+                </a:solidFill>
+                <a:latin typeface="Calibri"/>
+                <a:ea typeface="Calibri"/>
+                <a:cs typeface="Calibri"/>
+                <a:sym typeface="Calibri"/>
+              </a:rPr>
+              <a:t> ein ehemaliger Samurai vor seiner wichtigsten Schlacht Flo wurde er von den Göttern in eine Oni Maske verwandelt. Diese Form solle er behalten bis er seine Schuld beglichen habe. Nach dem </a:t>
+            </a:r>
+            <a:r>
+              <a:rPr lang="de-DE" sz="1800" b="0" i="0" u="none" strike="noStrike" cap="none" dirty="0" err="1">
+                <a:solidFill>
+                  <a:srgbClr val="242424"/>
+                </a:solidFill>
+                <a:latin typeface="Calibri"/>
+                <a:ea typeface="Calibri"/>
+                <a:cs typeface="Calibri"/>
+                <a:sym typeface="Calibri"/>
+              </a:rPr>
+              <a:t>they</a:t>
+            </a:r>
+            <a:r>
+              <a:rPr lang="de-DE" sz="1800" b="0" i="0" u="none" strike="noStrike" cap="none" dirty="0">
+                <a:solidFill>
+                  <a:srgbClr val="242424"/>
+                </a:solidFill>
+                <a:latin typeface="Calibri"/>
+                <a:ea typeface="Calibri"/>
+                <a:cs typeface="Calibri"/>
+                <a:sym typeface="Calibri"/>
+              </a:rPr>
+              <a:t> ihn in einem Museum gefunden hatte wurde er von ihr gekauft und hilft nun Menschen in ihrer Arzt Praxis.</a:t>
+            </a:r>
+            <a:endParaRPr sz="1800" b="0" i="0" u="none" strike="noStrike" cap="none" dirty="0">
               <a:solidFill>
                 <a:srgbClr val="242424"/>
               </a:solidFill>
@@ -26220,25 +26082,17 @@
           </a:bodyPr>
           <a:lstStyle/>
           <a:p>
-            <a:pPr marL="0" lvl="0" indent="0" algn="l" rtl="0">
+            <a:pPr lvl="0">
               <a:lnSpc>
                 <a:spcPct val="115000"/>
               </a:lnSpc>
-              <a:spcBef>
-                <a:spcPts val="0"/>
-              </a:spcBef>
-              <a:spcAft>
-                <a:spcPts val="0"/>
-              </a:spcAft>
               <a:buClr>
                 <a:schemeClr val="lt1"/>
               </a:buClr>
               <a:buSzPts val="1800"/>
-              <a:buFont typeface="Montserrat ExtraBold"/>
-              <a:buNone/>
             </a:pPr>
             <a:r>
-              <a:rPr lang="de" sz="1800">
+              <a:rPr lang="de-DE" sz="1800" dirty="0" err="1">
                 <a:solidFill>
                   <a:schemeClr val="lt1"/>
                 </a:solidFill>
@@ -26247,38 +26101,33 @@
                 <a:cs typeface="Montserrat ExtraBold"/>
                 <a:sym typeface="Montserrat ExtraBold"/>
               </a:rPr>
-              <a:t>Character Name</a:t>
+              <a:t>Kyoufu</a:t>
             </a:r>
-            <a:endParaRPr sz="1100" b="0" i="0" u="none" strike="noStrike" cap="none">
-              <a:solidFill>
-                <a:srgbClr val="000000"/>
-              </a:solidFill>
-              <a:latin typeface="Arial"/>
-              <a:ea typeface="Arial"/>
-              <a:cs typeface="Arial"/>
-              <a:sym typeface="Arial"/>
-            </a:endParaRPr>
+            <a:r>
+              <a:rPr lang="de-DE" sz="1800" dirty="0">
+                <a:solidFill>
+                  <a:schemeClr val="lt1"/>
+                </a:solidFill>
+                <a:latin typeface="Montserrat ExtraBold"/>
+                <a:ea typeface="Montserrat ExtraBold"/>
+                <a:cs typeface="Montserrat ExtraBold"/>
+                <a:sym typeface="Montserrat ExtraBold"/>
+              </a:rPr>
+              <a:t> </a:t>
+            </a:r>
           </a:p>
           <a:p>
-            <a:pPr marL="0" marR="0" lvl="0" indent="0" algn="l" rtl="0">
+            <a:pPr lvl="0">
               <a:lnSpc>
                 <a:spcPct val="115000"/>
               </a:lnSpc>
-              <a:spcBef>
-                <a:spcPts val="0"/>
-              </a:spcBef>
-              <a:spcAft>
-                <a:spcPts val="0"/>
-              </a:spcAft>
-              <a:buClr>
-                <a:srgbClr val="FFB951"/>
+              <a:buClr>
+                <a:schemeClr val="lt1"/>
               </a:buClr>
               <a:buSzPts val="1800"/>
-              <a:buFont typeface="Montserrat ExtraBold"/>
-              <a:buNone/>
             </a:pPr>
             <a:r>
-              <a:rPr lang="de" sz="1800" b="0" i="0" u="none" strike="noStrike" cap="none">
+              <a:rPr lang="de" sz="1800" b="0" i="0" u="none" strike="noStrike" cap="none" dirty="0">
                 <a:solidFill>
                   <a:srgbClr val="FFB951"/>
                 </a:solidFill>
@@ -26289,7 +26138,7 @@
               </a:rPr>
               <a:t>Character Bio (short)</a:t>
             </a:r>
-            <a:endParaRPr sz="1100" b="0" i="0" u="none" strike="noStrike" cap="none">
+            <a:endParaRPr sz="1100" b="0" i="0" u="none" strike="noStrike" cap="none" dirty="0">
               <a:solidFill>
                 <a:srgbClr val="000000"/>
               </a:solidFill>
@@ -26335,7 +26184,7 @@
         <p:spPr>
           <a:xfrm>
             <a:off x="22124" y="703635"/>
-            <a:ext cx="9122100" cy="3250800"/>
+            <a:ext cx="9122100" cy="1936654"/>
           </a:xfrm>
           <a:prstGeom prst="rect">
             <a:avLst/>
@@ -26362,13 +26211,94 @@
                 <a:spcPts val="0"/>
               </a:spcAft>
               <a:buClr>
-                <a:schemeClr val="dk1"/>
+                <a:srgbClr val="000000"/>
               </a:buClr>
               <a:buSzPts val="1800"/>
               <a:buFont typeface="Arial"/>
               <a:buNone/>
             </a:pPr>
-            <a:endParaRPr sz="1100" b="0" i="0" u="none" strike="noStrike" cap="none">
+            <a:r>
+              <a:rPr lang="de-DE" sz="1100" b="0" i="0" u="none" strike="noStrike" cap="none" dirty="0" err="1">
+                <a:solidFill>
+                  <a:srgbClr val="000000"/>
+                </a:solidFill>
+                <a:latin typeface="Arial"/>
+                <a:ea typeface="Arial"/>
+                <a:cs typeface="Arial"/>
+                <a:sym typeface="Arial"/>
+              </a:rPr>
+              <a:t>Kyoufu</a:t>
+            </a:r>
+            <a:r>
+              <a:rPr lang="de-DE" sz="1100" b="0" i="0" u="none" strike="noStrike" cap="none" dirty="0">
+                <a:solidFill>
+                  <a:srgbClr val="000000"/>
+                </a:solidFill>
+                <a:latin typeface="Arial"/>
+                <a:ea typeface="Arial"/>
+                <a:cs typeface="Arial"/>
+                <a:sym typeface="Arial"/>
+              </a:rPr>
+              <a:t> war sehr lange ein hoher Samurai </a:t>
+            </a:r>
+            <a:r>
+              <a:rPr lang="de-DE" sz="1100" dirty="0"/>
+              <a:t>Offizier. Er versuchte stets allen zu helfen. Vor großen Schlachten zog er sich immer zurück.</a:t>
+            </a:r>
+          </a:p>
+          <a:p>
+            <a:pPr marL="0" marR="0" lvl="0" indent="0" algn="l" rtl="0">
+              <a:lnSpc>
+                <a:spcPct val="115000"/>
+              </a:lnSpc>
+              <a:spcBef>
+                <a:spcPts val="0"/>
+              </a:spcBef>
+              <a:spcAft>
+                <a:spcPts val="0"/>
+              </a:spcAft>
+              <a:buClr>
+                <a:srgbClr val="000000"/>
+              </a:buClr>
+              <a:buSzPts val="1800"/>
+              <a:buFont typeface="Arial"/>
+              <a:buNone/>
+            </a:pPr>
+            <a:br>
+              <a:rPr lang="de-DE" sz="1100" b="0" i="0" u="none" strike="noStrike" cap="none" dirty="0">
+                <a:solidFill>
+                  <a:srgbClr val="000000"/>
+                </a:solidFill>
+                <a:latin typeface="Arial"/>
+                <a:ea typeface="Arial"/>
+                <a:cs typeface="Arial"/>
+                <a:sym typeface="Arial"/>
+              </a:rPr>
+            </a:br>
+            <a:r>
+              <a:rPr lang="de-DE" sz="1100" dirty="0"/>
+              <a:t>Vor der größten Schlacht die ihm bevor stand, sendete er alle seine Offiziere an die Front unter dem Versprechen, das er ihnen beisteht. Im letzten Moment floh er doch. Während er floh wurde er von einem Blitz getroffen, der ihn in eine Oni Maske verwandelte.</a:t>
+            </a:r>
+          </a:p>
+          <a:p>
+            <a:pPr marL="0" marR="0" lvl="0" indent="0" algn="l" rtl="0">
+              <a:lnSpc>
+                <a:spcPct val="115000"/>
+              </a:lnSpc>
+              <a:spcBef>
+                <a:spcPts val="0"/>
+              </a:spcBef>
+              <a:spcAft>
+                <a:spcPts val="0"/>
+              </a:spcAft>
+              <a:buClr>
+                <a:srgbClr val="000000"/>
+              </a:buClr>
+              <a:buSzPts val="1800"/>
+              <a:buFont typeface="Arial"/>
+              <a:buNone/>
+            </a:pPr>
+            <a:endParaRPr lang="de-DE" sz="1100" b="0" i="0" u="none" strike="noStrike" cap="none" dirty="0">
               <a:solidFill>
                 <a:srgbClr val="000000"/>
               </a:solidFill>
@@ -26384,123 +26314,66 @@
                 <a:spcPct val="115000"/>
               </a:lnSpc>
               <a:spcBef>
-                <a:spcPts val="900"/>
-              </a:spcBef>
-              <a:spcAft>
-                <a:spcPts val="0"/>
-              </a:spcAft>
-              <a:buClr>
-                <a:schemeClr val="dk1"/>
-              </a:buClr>
-              <a:buSzPts val="800"/>
-              <a:buFont typeface="Arial"/>
-              <a:buNone/>
-            </a:pPr>
-            <a:endParaRPr sz="1800" b="1" i="0" u="none" strike="noStrike" cap="none">
-              <a:solidFill>
-                <a:srgbClr val="FF0000"/>
-              </a:solidFill>
-              <a:latin typeface="Arial"/>
-              <a:ea typeface="Arial"/>
-              <a:cs typeface="Arial"/>
-              <a:sym typeface="Arial"/>
-            </a:endParaRPr>
-          </a:p>
-          <a:p>
-            <a:pPr marL="0" marR="0" lvl="0" indent="0" algn="l" rtl="0">
-              <a:lnSpc>
-                <a:spcPct val="115000"/>
-              </a:lnSpc>
-              <a:spcBef>
-                <a:spcPts val="900"/>
-              </a:spcBef>
-              <a:spcAft>
-                <a:spcPts val="0"/>
-              </a:spcAft>
-              <a:buClr>
-                <a:schemeClr val="dk1"/>
-              </a:buClr>
-              <a:buSzPts val="800"/>
-              <a:buFont typeface="Arial"/>
-              <a:buNone/>
-            </a:pPr>
-            <a:endParaRPr sz="1800" b="1" i="0" u="none" strike="noStrike" cap="none">
-              <a:solidFill>
-                <a:srgbClr val="FF0000"/>
-              </a:solidFill>
-              <a:latin typeface="Arial"/>
-              <a:ea typeface="Arial"/>
-              <a:cs typeface="Arial"/>
-              <a:sym typeface="Arial"/>
-            </a:endParaRPr>
-          </a:p>
-          <a:p>
-            <a:pPr marL="0" marR="0" lvl="0" indent="0" algn="l" rtl="0">
-              <a:lnSpc>
-                <a:spcPct val="115000"/>
-              </a:lnSpc>
-              <a:spcBef>
-                <a:spcPts val="900"/>
-              </a:spcBef>
-              <a:spcAft>
-                <a:spcPts val="0"/>
-              </a:spcAft>
-              <a:buClr>
-                <a:schemeClr val="dk1"/>
-              </a:buClr>
-              <a:buSzPts val="800"/>
-              <a:buFont typeface="Arial"/>
-              <a:buNone/>
-            </a:pPr>
-            <a:endParaRPr sz="1800" b="1" i="0" u="none" strike="noStrike" cap="none">
-              <a:solidFill>
-                <a:srgbClr val="FF0000"/>
-              </a:solidFill>
-              <a:latin typeface="Arial"/>
-              <a:ea typeface="Arial"/>
-              <a:cs typeface="Arial"/>
-              <a:sym typeface="Arial"/>
-            </a:endParaRPr>
-          </a:p>
-          <a:p>
-            <a:pPr marL="0" marR="0" lvl="0" indent="0" algn="l" rtl="0">
-              <a:lnSpc>
-                <a:spcPct val="115000"/>
-              </a:lnSpc>
-              <a:spcBef>
-                <a:spcPts val="900"/>
-              </a:spcBef>
-              <a:spcAft>
-                <a:spcPts val="0"/>
-              </a:spcAft>
-              <a:buClr>
-                <a:schemeClr val="dk1"/>
-              </a:buClr>
-              <a:buSzPts val="800"/>
+                <a:spcPts val="0"/>
+              </a:spcBef>
+              <a:spcAft>
+                <a:spcPts val="0"/>
+              </a:spcAft>
+              <a:buClr>
+                <a:srgbClr val="000000"/>
+              </a:buClr>
+              <a:buSzPts val="1800"/>
               <a:buFont typeface="Arial"/>
               <a:buNone/>
             </a:pPr>
             <a:r>
-              <a:rPr lang="de" sz="1800" b="1" i="0" u="none" strike="noStrike" cap="none">
-                <a:solidFill>
-                  <a:srgbClr val="FF0000"/>
+              <a:rPr lang="de-DE" sz="1100" b="0" i="0" u="none" strike="noStrike" cap="none" dirty="0">
+                <a:solidFill>
+                  <a:srgbClr val="000000"/>
                 </a:solidFill>
                 <a:latin typeface="Arial"/>
                 <a:ea typeface="Arial"/>
                 <a:cs typeface="Arial"/>
                 <a:sym typeface="Arial"/>
               </a:rPr>
-              <a:t>Describe the past, the what and the now (see the checklist)</a:t>
+              <a:t>Nachdem er von </a:t>
             </a:r>
-            <a:endParaRPr sz="1800" b="1" i="0" u="none" strike="noStrike" cap="none">
-              <a:solidFill>
-                <a:srgbClr val="FF0000"/>
-              </a:solidFill>
-              <a:latin typeface="Arial"/>
-              <a:ea typeface="Arial"/>
-              <a:cs typeface="Arial"/>
-              <a:sym typeface="Arial"/>
-            </a:endParaRPr>
+            <a:r>
+              <a:rPr lang="de-DE" sz="1100" b="0" i="0" u="none" strike="noStrike" cap="none" dirty="0" err="1">
+                <a:solidFill>
+                  <a:srgbClr val="000000"/>
+                </a:solidFill>
+                <a:latin typeface="Arial"/>
+                <a:ea typeface="Arial"/>
+                <a:cs typeface="Arial"/>
+                <a:sym typeface="Arial"/>
+              </a:rPr>
+              <a:t>Archeologen</a:t>
+            </a:r>
+            <a:r>
+              <a:rPr lang="de-DE" sz="1100" b="0" i="0" u="none" strike="noStrike" cap="none" dirty="0">
+                <a:solidFill>
+                  <a:srgbClr val="000000"/>
+                </a:solidFill>
+                <a:latin typeface="Arial"/>
+                <a:ea typeface="Arial"/>
+                <a:cs typeface="Arial"/>
+                <a:sym typeface="Arial"/>
+              </a:rPr>
+              <a:t> an seinem Todes</a:t>
+            </a:r>
+            <a:r>
+              <a:rPr lang="de-DE" sz="1100" dirty="0"/>
+              <a:t>ort ausgegraben wurde, verbachte er viele Jahre in einem Museum, bis er von </a:t>
+            </a:r>
+            <a:r>
+              <a:rPr lang="de-DE" sz="1100" dirty="0" err="1"/>
+              <a:t>They</a:t>
+            </a:r>
+            <a:r>
+              <a:rPr lang="de-DE" sz="1100" dirty="0"/>
+              <a:t> ersteigert wurde.</a:t>
+            </a:r>
           </a:p>
           <a:p>
             <a:pPr marL="0" marR="0" lvl="0" indent="0" algn="l" rtl="0">
@@ -26508,27 +26381,19 @@
                 <a:spcPct val="115000"/>
               </a:lnSpc>
               <a:spcBef>
-                <a:spcPts val="900"/>
-              </a:spcBef>
-              <a:spcAft>
-                <a:spcPts val="0"/>
-              </a:spcAft>
-              <a:buClr>
-                <a:schemeClr val="dk1"/>
-              </a:buClr>
-              <a:buSzPts val="800"/>
+                <a:spcPts val="0"/>
+              </a:spcBef>
+              <a:spcAft>
+                <a:spcPts val="0"/>
+              </a:spcAft>
+              <a:buClr>
+                <a:srgbClr val="000000"/>
+              </a:buClr>
+              <a:buSzPts val="1800"/>
               <a:buFont typeface="Arial"/>
               <a:buNone/>
             </a:pPr>
-            <a:endParaRPr sz="1200" b="0" i="0" u="none" strike="noStrike" cap="none">
-              <a:solidFill>
-                <a:srgbClr val="242424"/>
-              </a:solidFill>
-              <a:latin typeface="Arial"/>
-              <a:ea typeface="Arial"/>
-              <a:cs typeface="Arial"/>
-              <a:sym typeface="Arial"/>
-            </a:endParaRPr>
+            <a:endParaRPr lang="de-DE" sz="1100" dirty="0"/>
           </a:p>
           <a:p>
             <a:pPr marL="0" marR="0" lvl="0" indent="0" algn="l" rtl="0">
@@ -26536,35 +26401,7 @@
                 <a:spcPct val="115000"/>
               </a:lnSpc>
               <a:spcBef>
-                <a:spcPts val="900"/>
-              </a:spcBef>
-              <a:spcAft>
-                <a:spcPts val="0"/>
-              </a:spcAft>
-              <a:buClr>
-                <a:schemeClr val="dk1"/>
-              </a:buClr>
-              <a:buSzPts val="800"/>
-              <a:buFont typeface="Arial"/>
-              <a:buNone/>
-            </a:pPr>
-            <a:endParaRPr sz="1200" b="1" i="0" u="none" strike="noStrike" cap="none">
-              <a:solidFill>
-                <a:srgbClr val="FF0000"/>
-              </a:solidFill>
-              <a:latin typeface="Arial"/>
-              <a:ea typeface="Arial"/>
-              <a:cs typeface="Arial"/>
-              <a:sym typeface="Arial"/>
-            </a:endParaRPr>
-          </a:p>
-          <a:p>
-            <a:pPr marL="0" marR="0" lvl="0" indent="0" algn="l" rtl="0">
-              <a:lnSpc>
-                <a:spcPct val="115000"/>
-              </a:lnSpc>
-              <a:spcBef>
-                <a:spcPts val="900"/>
+                <a:spcPts val="0"/>
               </a:spcBef>
               <a:spcAft>
                 <a:spcPts val="0"/>
@@ -26576,43 +26413,10 @@
               <a:buFont typeface="Arial"/>
               <a:buNone/>
             </a:pPr>
-            <a:endParaRPr sz="1100" b="1" i="0" u="none" strike="noStrike" cap="none">
-              <a:solidFill>
-                <a:srgbClr val="FF0000"/>
-              </a:solidFill>
-              <a:latin typeface="Arial"/>
-              <a:ea typeface="Arial"/>
-              <a:cs typeface="Arial"/>
-              <a:sym typeface="Arial"/>
-            </a:endParaRPr>
-          </a:p>
-          <a:p>
-            <a:pPr marL="0" marR="0" lvl="0" indent="0" algn="l" rtl="0">
-              <a:lnSpc>
-                <a:spcPct val="115000"/>
-              </a:lnSpc>
-              <a:spcBef>
-                <a:spcPts val="0"/>
-              </a:spcBef>
-              <a:spcAft>
-                <a:spcPts val="0"/>
-              </a:spcAft>
-              <a:buClr>
-                <a:srgbClr val="000000"/>
-              </a:buClr>
-              <a:buSzPts val="1800"/>
-              <a:buFont typeface="Arial"/>
-              <a:buNone/>
-            </a:pPr>
-            <a:endParaRPr sz="1100" b="0" i="0" u="none" strike="noStrike" cap="none">
-              <a:solidFill>
-                <a:srgbClr val="000000"/>
-              </a:solidFill>
-              <a:latin typeface="Arial"/>
-              <a:ea typeface="Arial"/>
-              <a:cs typeface="Arial"/>
-              <a:sym typeface="Arial"/>
-            </a:endParaRPr>
+            <a:r>
+              <a:rPr lang="de-DE" sz="1100" dirty="0"/>
+              <a:t>Nun versucht er seine Schuld zu begleichen in dem er Menschen beim Einschlafen hilft.</a:t>
+            </a:r>
           </a:p>
         </p:txBody>
       </p:sp>
@@ -26910,25 +26714,17 @@
           </a:bodyPr>
           <a:lstStyle/>
           <a:p>
-            <a:pPr marL="0" lvl="0" indent="0" algn="l" rtl="0">
+            <a:pPr lvl="0">
               <a:lnSpc>
                 <a:spcPct val="115000"/>
               </a:lnSpc>
-              <a:spcBef>
-                <a:spcPts val="0"/>
-              </a:spcBef>
-              <a:spcAft>
-                <a:spcPts val="0"/>
-              </a:spcAft>
               <a:buClr>
                 <a:schemeClr val="lt1"/>
               </a:buClr>
               <a:buSzPts val="1800"/>
-              <a:buFont typeface="Montserrat ExtraBold"/>
-              <a:buNone/>
             </a:pPr>
             <a:r>
-              <a:rPr lang="de" sz="1800">
+              <a:rPr lang="de-DE" sz="1800" dirty="0" err="1">
                 <a:solidFill>
                   <a:schemeClr val="lt1"/>
                 </a:solidFill>
@@ -26937,38 +26733,33 @@
                 <a:cs typeface="Montserrat ExtraBold"/>
                 <a:sym typeface="Montserrat ExtraBold"/>
               </a:rPr>
-              <a:t>Character Name</a:t>
+              <a:t>Kyoufu</a:t>
             </a:r>
-            <a:endParaRPr sz="1100" b="0" i="0" u="none" strike="noStrike" cap="none">
-              <a:solidFill>
-                <a:srgbClr val="000000"/>
-              </a:solidFill>
-              <a:latin typeface="Arial"/>
-              <a:ea typeface="Arial"/>
-              <a:cs typeface="Arial"/>
-              <a:sym typeface="Arial"/>
-            </a:endParaRPr>
+            <a:r>
+              <a:rPr lang="de-DE" sz="1800" dirty="0">
+                <a:solidFill>
+                  <a:schemeClr val="lt1"/>
+                </a:solidFill>
+                <a:latin typeface="Montserrat ExtraBold"/>
+                <a:ea typeface="Montserrat ExtraBold"/>
+                <a:cs typeface="Montserrat ExtraBold"/>
+                <a:sym typeface="Montserrat ExtraBold"/>
+              </a:rPr>
+              <a:t> </a:t>
+            </a:r>
           </a:p>
           <a:p>
-            <a:pPr marL="0" marR="0" lvl="0" indent="0" algn="l" rtl="0">
+            <a:pPr lvl="0">
               <a:lnSpc>
                 <a:spcPct val="115000"/>
               </a:lnSpc>
-              <a:spcBef>
-                <a:spcPts val="0"/>
-              </a:spcBef>
-              <a:spcAft>
-                <a:spcPts val="0"/>
-              </a:spcAft>
-              <a:buClr>
-                <a:srgbClr val="FFB951"/>
+              <a:buClr>
+                <a:schemeClr val="lt1"/>
               </a:buClr>
               <a:buSzPts val="1800"/>
-              <a:buFont typeface="Montserrat ExtraBold"/>
-              <a:buNone/>
             </a:pPr>
             <a:r>
-              <a:rPr lang="de" sz="1800" b="0" i="0" u="none" strike="noStrike" cap="none">
+              <a:rPr lang="de" sz="1800" b="0" i="0" u="none" strike="noStrike" cap="none" dirty="0">
                 <a:solidFill>
                   <a:srgbClr val="FFB951"/>
                 </a:solidFill>
@@ -26979,7 +26770,7 @@
               </a:rPr>
               <a:t>Character Bio (Long)</a:t>
             </a:r>
-            <a:endParaRPr sz="1100" b="0" i="0" u="none" strike="noStrike" cap="none">
+            <a:endParaRPr sz="1100" b="0" i="0" u="none" strike="noStrike" cap="none" dirty="0">
               <a:solidFill>
                 <a:srgbClr val="000000"/>
               </a:solidFill>
@@ -27000,2240 +26791,6 @@
 </file>
 
 <file path=ppt/slides/slide5.xml><?xml version="1.0" encoding="utf-8"?>
-<p:sld xmlns:a="http://schemas.openxmlformats.org/drawingml/2006/main" xmlns:r="http://schemas.openxmlformats.org/officeDocument/2006/relationships" xmlns:p="http://schemas.openxmlformats.org/presentationml/2006/main">
-  <p:cSld>
-    <p:spTree>
-      <p:nvGrpSpPr>
-        <p:cNvPr id="1" name="Shape 236"/>
-        <p:cNvGrpSpPr/>
-        <p:nvPr/>
-      </p:nvGrpSpPr>
-      <p:grpSpPr>
-        <a:xfrm>
-          <a:off x="0" y="0"/>
-          <a:ext cx="0" cy="0"/>
-          <a:chOff x="0" y="0"/>
-          <a:chExt cx="0" cy="0"/>
-        </a:xfrm>
-      </p:grpSpPr>
-      <p:graphicFrame>
-        <p:nvGraphicFramePr>
-          <p:cNvPr id="237" name="Google Shape;237;p6"/>
-          <p:cNvGraphicFramePr/>
-          <p:nvPr/>
-        </p:nvGraphicFramePr>
-        <p:xfrm>
-          <a:off x="35626" y="50514"/>
-          <a:ext cx="9108375" cy="5521740"/>
-        </p:xfrm>
-        <a:graphic>
-          <a:graphicData uri="http://schemas.openxmlformats.org/drawingml/2006/table">
-            <a:tbl>
-              <a:tblPr firstRow="1" bandRow="1">
-                <a:noFill/>
-                <a:tableStyleId>{692E3274-4D5C-44BF-BB08-FA6336CB3DAF}</a:tableStyleId>
-              </a:tblPr>
-              <a:tblGrid>
-                <a:gridCol w="1291725">
-                  <a:extLst>
-                    <a:ext uri="{9D8B030D-6E8A-4147-A177-3AD203B41FA5}">
-                      <a16:colId xmlns:a16="http://schemas.microsoft.com/office/drawing/2014/main" val="20000"/>
-                    </a:ext>
-                  </a:extLst>
-                </a:gridCol>
-                <a:gridCol w="3939800">
-                  <a:extLst>
-                    <a:ext uri="{9D8B030D-6E8A-4147-A177-3AD203B41FA5}">
-                      <a16:colId xmlns:a16="http://schemas.microsoft.com/office/drawing/2014/main" val="20001"/>
-                    </a:ext>
-                  </a:extLst>
-                </a:gridCol>
-                <a:gridCol w="3876850">
-                  <a:extLst>
-                    <a:ext uri="{9D8B030D-6E8A-4147-A177-3AD203B41FA5}">
-                      <a16:colId xmlns:a16="http://schemas.microsoft.com/office/drawing/2014/main" val="20002"/>
-                    </a:ext>
-                  </a:extLst>
-                </a:gridCol>
-              </a:tblGrid>
-              <a:tr h="239450">
-                <a:tc>
-                  <a:txBody>
-                    <a:bodyPr/>
-                    <a:lstStyle/>
-                    <a:p>
-                      <a:pPr marL="0" marR="0" lvl="0" indent="0" algn="ctr" rtl="0">
-                        <a:lnSpc>
-                          <a:spcPct val="100000"/>
-                        </a:lnSpc>
-                        <a:spcBef>
-                          <a:spcPts val="0"/>
-                        </a:spcBef>
-                        <a:spcAft>
-                          <a:spcPts val="0"/>
-                        </a:spcAft>
-                        <a:buClr>
-                          <a:schemeClr val="dk1"/>
-                        </a:buClr>
-                        <a:buSzPts val="1100"/>
-                        <a:buFont typeface="Arial"/>
-                        <a:buNone/>
-                      </a:pPr>
-                      <a:r>
-                        <a:rPr lang="de" sz="1100" b="1" u="none" strike="noStrike" cap="none">
-                          <a:solidFill>
-                            <a:schemeClr val="dk1"/>
-                          </a:solidFill>
-                        </a:rPr>
-                        <a:t>Character: (Name)</a:t>
-                      </a:r>
-                      <a:endParaRPr sz="1100" u="none" strike="noStrike" cap="none"/>
-                    </a:p>
-                  </a:txBody>
-                  <a:tcPr marL="68600" marR="68600" marT="34300" marB="34300">
-                    <a:solidFill>
-                      <a:srgbClr val="FFC000"/>
-                    </a:solidFill>
-                  </a:tcPr>
-                </a:tc>
-                <a:tc>
-                  <a:txBody>
-                    <a:bodyPr/>
-                    <a:lstStyle/>
-                    <a:p>
-                      <a:pPr marL="0" marR="0" lvl="0" indent="0" algn="ctr" rtl="0">
-                        <a:lnSpc>
-                          <a:spcPct val="100000"/>
-                        </a:lnSpc>
-                        <a:spcBef>
-                          <a:spcPts val="0"/>
-                        </a:spcBef>
-                        <a:spcAft>
-                          <a:spcPts val="0"/>
-                        </a:spcAft>
-                        <a:buClr>
-                          <a:srgbClr val="000000"/>
-                        </a:buClr>
-                        <a:buSzPts val="1100"/>
-                        <a:buFont typeface="Arial"/>
-                        <a:buNone/>
-                      </a:pPr>
-                      <a:r>
-                        <a:rPr lang="de" sz="1100" b="1" u="none" strike="noStrike" cap="none">
-                          <a:solidFill>
-                            <a:schemeClr val="dk1"/>
-                          </a:solidFill>
-                        </a:rPr>
-                        <a:t>DIALOGUE BARK – </a:t>
-                      </a:r>
-                      <a:r>
-                        <a:rPr lang="de" sz="1100">
-                          <a:solidFill>
-                            <a:schemeClr val="dk1"/>
-                          </a:solidFill>
-                        </a:rPr>
-                        <a:t>Situation </a:t>
-                      </a:r>
-                      <a:r>
-                        <a:rPr lang="de" sz="1100" b="1" u="none" strike="noStrike" cap="none">
-                          <a:solidFill>
-                            <a:schemeClr val="dk1"/>
-                          </a:solidFill>
-                        </a:rPr>
-                        <a:t>v01</a:t>
-                      </a:r>
-                      <a:endParaRPr sz="1100" u="none" strike="noStrike" cap="none"/>
-                    </a:p>
-                  </a:txBody>
-                  <a:tcPr marL="68600" marR="68600" marT="34300" marB="34300">
-                    <a:solidFill>
-                      <a:srgbClr val="FFC000"/>
-                    </a:solidFill>
-                  </a:tcPr>
-                </a:tc>
-                <a:tc>
-                  <a:txBody>
-                    <a:bodyPr/>
-                    <a:lstStyle/>
-                    <a:p>
-                      <a:pPr marL="0" marR="0" lvl="0" indent="0" algn="ctr" rtl="0">
-                        <a:lnSpc>
-                          <a:spcPct val="100000"/>
-                        </a:lnSpc>
-                        <a:spcBef>
-                          <a:spcPts val="0"/>
-                        </a:spcBef>
-                        <a:spcAft>
-                          <a:spcPts val="0"/>
-                        </a:spcAft>
-                        <a:buClr>
-                          <a:schemeClr val="dk1"/>
-                        </a:buClr>
-                        <a:buSzPts val="1100"/>
-                        <a:buFont typeface="Arial"/>
-                        <a:buNone/>
-                      </a:pPr>
-                      <a:r>
-                        <a:rPr lang="de" sz="1100" b="1" u="none" strike="noStrike" cap="none">
-                          <a:solidFill>
-                            <a:schemeClr val="dk1"/>
-                          </a:solidFill>
-                        </a:rPr>
-                        <a:t>DIALOGUE BARK – </a:t>
-                      </a:r>
-                      <a:r>
-                        <a:rPr lang="de" sz="1100">
-                          <a:solidFill>
-                            <a:schemeClr val="dk1"/>
-                          </a:solidFill>
-                        </a:rPr>
-                        <a:t>Situation </a:t>
-                      </a:r>
-                      <a:r>
-                        <a:rPr lang="de" sz="1100" b="1" u="none" strike="noStrike" cap="none">
-                          <a:solidFill>
-                            <a:schemeClr val="dk1"/>
-                          </a:solidFill>
-                        </a:rPr>
-                        <a:t>v02</a:t>
-                      </a:r>
-                      <a:endParaRPr sz="1100" u="none" strike="noStrike" cap="none"/>
-                    </a:p>
-                  </a:txBody>
-                  <a:tcPr marL="68600" marR="68600" marT="34300" marB="34300">
-                    <a:solidFill>
-                      <a:srgbClr val="FFC000"/>
-                    </a:solidFill>
-                  </a:tcPr>
-                </a:tc>
-                <a:extLst>
-                  <a:ext uri="{0D108BD9-81ED-4DB2-BD59-A6C34878D82A}">
-                    <a16:rowId xmlns:a16="http://schemas.microsoft.com/office/drawing/2014/main" val="10000"/>
-                  </a:ext>
-                </a:extLst>
-              </a:tr>
-              <a:tr h="239450">
-                <a:tc>
-                  <a:txBody>
-                    <a:bodyPr/>
-                    <a:lstStyle/>
-                    <a:p>
-                      <a:pPr marL="0" marR="0" lvl="0" indent="0" algn="l" rtl="0">
-                        <a:lnSpc>
-                          <a:spcPct val="100000"/>
-                        </a:lnSpc>
-                        <a:spcBef>
-                          <a:spcPts val="0"/>
-                        </a:spcBef>
-                        <a:spcAft>
-                          <a:spcPts val="0"/>
-                        </a:spcAft>
-                        <a:buClr>
-                          <a:srgbClr val="000000"/>
-                        </a:buClr>
-                        <a:buSzPts val="1100"/>
-                        <a:buFont typeface="Arial"/>
-                        <a:buNone/>
-                      </a:pPr>
-                      <a:r>
-                        <a:rPr lang="de" sz="1100"/>
-                        <a:t>Location/Action</a:t>
-                      </a:r>
-                      <a:endParaRPr sz="1100" u="none" strike="noStrike" cap="none"/>
-                    </a:p>
-                  </a:txBody>
-                  <a:tcPr marL="68600" marR="68600" marT="34300" marB="34300">
-                    <a:noFill/>
-                  </a:tcPr>
-                </a:tc>
-                <a:tc>
-                  <a:txBody>
-                    <a:bodyPr/>
-                    <a:lstStyle/>
-                    <a:p>
-                      <a:pPr marL="0" marR="0" lvl="0" indent="0" algn="l" rtl="0">
-                        <a:lnSpc>
-                          <a:spcPct val="100000"/>
-                        </a:lnSpc>
-                        <a:spcBef>
-                          <a:spcPts val="0"/>
-                        </a:spcBef>
-                        <a:spcAft>
-                          <a:spcPts val="0"/>
-                        </a:spcAft>
-                        <a:buClr>
-                          <a:srgbClr val="000000"/>
-                        </a:buClr>
-                        <a:buSzPts val="1100"/>
-                        <a:buFont typeface="Arial"/>
-                        <a:buNone/>
-                      </a:pPr>
-                      <a:endParaRPr sz="1100" u="none" strike="noStrike" cap="none"/>
-                    </a:p>
-                  </a:txBody>
-                  <a:tcPr marL="68600" marR="68600" marT="34300" marB="34300">
-                    <a:noFill/>
-                  </a:tcPr>
-                </a:tc>
-                <a:tc>
-                  <a:txBody>
-                    <a:bodyPr/>
-                    <a:lstStyle/>
-                    <a:p>
-                      <a:pPr marL="0" marR="0" lvl="0" indent="0" algn="l" rtl="0">
-                        <a:lnSpc>
-                          <a:spcPct val="100000"/>
-                        </a:lnSpc>
-                        <a:spcBef>
-                          <a:spcPts val="0"/>
-                        </a:spcBef>
-                        <a:spcAft>
-                          <a:spcPts val="0"/>
-                        </a:spcAft>
-                        <a:buClr>
-                          <a:srgbClr val="000000"/>
-                        </a:buClr>
-                        <a:buSzPts val="1100"/>
-                        <a:buFont typeface="Arial"/>
-                        <a:buNone/>
-                      </a:pPr>
-                      <a:endParaRPr sz="1100" u="none" strike="noStrike" cap="none"/>
-                    </a:p>
-                  </a:txBody>
-                  <a:tcPr marL="68600" marR="68600" marT="34300" marB="34300">
-                    <a:noFill/>
-                  </a:tcPr>
-                </a:tc>
-                <a:extLst>
-                  <a:ext uri="{0D108BD9-81ED-4DB2-BD59-A6C34878D82A}">
-                    <a16:rowId xmlns:a16="http://schemas.microsoft.com/office/drawing/2014/main" val="10001"/>
-                  </a:ext>
-                </a:extLst>
-              </a:tr>
-              <a:tr h="239450">
-                <a:tc>
-                  <a:txBody>
-                    <a:bodyPr/>
-                    <a:lstStyle/>
-                    <a:p>
-                      <a:pPr marL="0" lvl="0" indent="0" algn="l" rtl="0">
-                        <a:spcBef>
-                          <a:spcPts val="0"/>
-                        </a:spcBef>
-                        <a:spcAft>
-                          <a:spcPts val="0"/>
-                        </a:spcAft>
-                        <a:buClr>
-                          <a:schemeClr val="dk1"/>
-                        </a:buClr>
-                        <a:buSzPts val="1100"/>
-                        <a:buFont typeface="Arial"/>
-                        <a:buNone/>
-                      </a:pPr>
-                      <a:r>
-                        <a:rPr lang="de" sz="1100"/>
-                        <a:t>Location/Action</a:t>
-                      </a:r>
-                      <a:endParaRPr sz="1100" u="none" strike="noStrike" cap="none"/>
-                    </a:p>
-                  </a:txBody>
-                  <a:tcPr marL="68600" marR="68600" marT="34300" marB="34300">
-                    <a:noFill/>
-                  </a:tcPr>
-                </a:tc>
-                <a:tc>
-                  <a:txBody>
-                    <a:bodyPr/>
-                    <a:lstStyle/>
-                    <a:p>
-                      <a:pPr marL="0" marR="0" lvl="0" indent="0" algn="l" rtl="0">
-                        <a:lnSpc>
-                          <a:spcPct val="100000"/>
-                        </a:lnSpc>
-                        <a:spcBef>
-                          <a:spcPts val="0"/>
-                        </a:spcBef>
-                        <a:spcAft>
-                          <a:spcPts val="0"/>
-                        </a:spcAft>
-                        <a:buClr>
-                          <a:srgbClr val="000000"/>
-                        </a:buClr>
-                        <a:buSzPts val="1100"/>
-                        <a:buFont typeface="Arial"/>
-                        <a:buNone/>
-                      </a:pPr>
-                      <a:endParaRPr sz="1100" u="none" strike="noStrike" cap="none"/>
-                    </a:p>
-                  </a:txBody>
-                  <a:tcPr marL="68600" marR="68600" marT="34300" marB="34300">
-                    <a:noFill/>
-                  </a:tcPr>
-                </a:tc>
-                <a:tc>
-                  <a:txBody>
-                    <a:bodyPr/>
-                    <a:lstStyle/>
-                    <a:p>
-                      <a:pPr marL="0" marR="0" lvl="0" indent="0" algn="l" rtl="0">
-                        <a:lnSpc>
-                          <a:spcPct val="100000"/>
-                        </a:lnSpc>
-                        <a:spcBef>
-                          <a:spcPts val="0"/>
-                        </a:spcBef>
-                        <a:spcAft>
-                          <a:spcPts val="0"/>
-                        </a:spcAft>
-                        <a:buClr>
-                          <a:srgbClr val="000000"/>
-                        </a:buClr>
-                        <a:buSzPts val="1100"/>
-                        <a:buFont typeface="Arial"/>
-                        <a:buNone/>
-                      </a:pPr>
-                      <a:endParaRPr sz="1100" u="none" strike="noStrike" cap="none"/>
-                    </a:p>
-                  </a:txBody>
-                  <a:tcPr marL="68600" marR="68600" marT="34300" marB="34300">
-                    <a:noFill/>
-                  </a:tcPr>
-                </a:tc>
-                <a:extLst>
-                  <a:ext uri="{0D108BD9-81ED-4DB2-BD59-A6C34878D82A}">
-                    <a16:rowId xmlns:a16="http://schemas.microsoft.com/office/drawing/2014/main" val="10002"/>
-                  </a:ext>
-                </a:extLst>
-              </a:tr>
-              <a:tr h="239450">
-                <a:tc>
-                  <a:txBody>
-                    <a:bodyPr/>
-                    <a:lstStyle/>
-                    <a:p>
-                      <a:pPr marL="0" lvl="0" indent="0" algn="l" rtl="0">
-                        <a:spcBef>
-                          <a:spcPts val="0"/>
-                        </a:spcBef>
-                        <a:spcAft>
-                          <a:spcPts val="0"/>
-                        </a:spcAft>
-                        <a:buClr>
-                          <a:schemeClr val="dk1"/>
-                        </a:buClr>
-                        <a:buSzPts val="1100"/>
-                        <a:buFont typeface="Arial"/>
-                        <a:buNone/>
-                      </a:pPr>
-                      <a:r>
-                        <a:rPr lang="de" sz="1100"/>
-                        <a:t>Location/Action</a:t>
-                      </a:r>
-                      <a:endParaRPr sz="1100" u="none" strike="noStrike" cap="none"/>
-                    </a:p>
-                  </a:txBody>
-                  <a:tcPr marL="68600" marR="68600" marT="34300" marB="34300">
-                    <a:noFill/>
-                  </a:tcPr>
-                </a:tc>
-                <a:tc>
-                  <a:txBody>
-                    <a:bodyPr/>
-                    <a:lstStyle/>
-                    <a:p>
-                      <a:pPr marL="0" marR="0" lvl="0" indent="0" algn="l" rtl="0">
-                        <a:lnSpc>
-                          <a:spcPct val="100000"/>
-                        </a:lnSpc>
-                        <a:spcBef>
-                          <a:spcPts val="0"/>
-                        </a:spcBef>
-                        <a:spcAft>
-                          <a:spcPts val="0"/>
-                        </a:spcAft>
-                        <a:buClr>
-                          <a:srgbClr val="000000"/>
-                        </a:buClr>
-                        <a:buSzPts val="1100"/>
-                        <a:buFont typeface="Arial"/>
-                        <a:buNone/>
-                      </a:pPr>
-                      <a:endParaRPr sz="1100" u="none" strike="noStrike" cap="none"/>
-                    </a:p>
-                  </a:txBody>
-                  <a:tcPr marL="68600" marR="68600" marT="34300" marB="34300">
-                    <a:noFill/>
-                  </a:tcPr>
-                </a:tc>
-                <a:tc>
-                  <a:txBody>
-                    <a:bodyPr/>
-                    <a:lstStyle/>
-                    <a:p>
-                      <a:pPr marL="0" marR="0" lvl="0" indent="0" algn="l" rtl="0">
-                        <a:lnSpc>
-                          <a:spcPct val="100000"/>
-                        </a:lnSpc>
-                        <a:spcBef>
-                          <a:spcPts val="0"/>
-                        </a:spcBef>
-                        <a:spcAft>
-                          <a:spcPts val="0"/>
-                        </a:spcAft>
-                        <a:buClr>
-                          <a:srgbClr val="000000"/>
-                        </a:buClr>
-                        <a:buSzPts val="1100"/>
-                        <a:buFont typeface="Arial"/>
-                        <a:buNone/>
-                      </a:pPr>
-                      <a:endParaRPr sz="1100" u="none" strike="noStrike" cap="none"/>
-                    </a:p>
-                  </a:txBody>
-                  <a:tcPr marL="68600" marR="68600" marT="34300" marB="34300">
-                    <a:noFill/>
-                  </a:tcPr>
-                </a:tc>
-                <a:extLst>
-                  <a:ext uri="{0D108BD9-81ED-4DB2-BD59-A6C34878D82A}">
-                    <a16:rowId xmlns:a16="http://schemas.microsoft.com/office/drawing/2014/main" val="10003"/>
-                  </a:ext>
-                </a:extLst>
-              </a:tr>
-              <a:tr h="239450">
-                <a:tc>
-                  <a:txBody>
-                    <a:bodyPr/>
-                    <a:lstStyle/>
-                    <a:p>
-                      <a:pPr marL="0" lvl="0" indent="0" algn="l" rtl="0">
-                        <a:spcBef>
-                          <a:spcPts val="0"/>
-                        </a:spcBef>
-                        <a:spcAft>
-                          <a:spcPts val="0"/>
-                        </a:spcAft>
-                        <a:buClr>
-                          <a:schemeClr val="dk1"/>
-                        </a:buClr>
-                        <a:buSzPts val="1100"/>
-                        <a:buFont typeface="Arial"/>
-                        <a:buNone/>
-                      </a:pPr>
-                      <a:r>
-                        <a:rPr lang="de" sz="1100"/>
-                        <a:t>Location/Action</a:t>
-                      </a:r>
-                      <a:endParaRPr sz="1100" u="none" strike="noStrike" cap="none"/>
-                    </a:p>
-                  </a:txBody>
-                  <a:tcPr marL="68600" marR="68600" marT="34300" marB="34300">
-                    <a:noFill/>
-                  </a:tcPr>
-                </a:tc>
-                <a:tc>
-                  <a:txBody>
-                    <a:bodyPr/>
-                    <a:lstStyle/>
-                    <a:p>
-                      <a:pPr marL="0" marR="0" lvl="0" indent="0" algn="l" rtl="0">
-                        <a:lnSpc>
-                          <a:spcPct val="100000"/>
-                        </a:lnSpc>
-                        <a:spcBef>
-                          <a:spcPts val="0"/>
-                        </a:spcBef>
-                        <a:spcAft>
-                          <a:spcPts val="0"/>
-                        </a:spcAft>
-                        <a:buClr>
-                          <a:srgbClr val="000000"/>
-                        </a:buClr>
-                        <a:buSzPts val="1100"/>
-                        <a:buFont typeface="Arial"/>
-                        <a:buNone/>
-                      </a:pPr>
-                      <a:endParaRPr sz="1100" u="none" strike="noStrike" cap="none"/>
-                    </a:p>
-                  </a:txBody>
-                  <a:tcPr marL="68600" marR="68600" marT="34300" marB="34300">
-                    <a:noFill/>
-                  </a:tcPr>
-                </a:tc>
-                <a:tc>
-                  <a:txBody>
-                    <a:bodyPr/>
-                    <a:lstStyle/>
-                    <a:p>
-                      <a:pPr marL="0" marR="0" lvl="0" indent="0" algn="l" rtl="0">
-                        <a:lnSpc>
-                          <a:spcPct val="100000"/>
-                        </a:lnSpc>
-                        <a:spcBef>
-                          <a:spcPts val="0"/>
-                        </a:spcBef>
-                        <a:spcAft>
-                          <a:spcPts val="0"/>
-                        </a:spcAft>
-                        <a:buClr>
-                          <a:srgbClr val="000000"/>
-                        </a:buClr>
-                        <a:buSzPts val="1100"/>
-                        <a:buFont typeface="Arial"/>
-                        <a:buNone/>
-                      </a:pPr>
-                      <a:endParaRPr sz="1100" u="none" strike="noStrike" cap="none"/>
-                    </a:p>
-                  </a:txBody>
-                  <a:tcPr marL="68600" marR="68600" marT="34300" marB="34300">
-                    <a:noFill/>
-                  </a:tcPr>
-                </a:tc>
-                <a:extLst>
-                  <a:ext uri="{0D108BD9-81ED-4DB2-BD59-A6C34878D82A}">
-                    <a16:rowId xmlns:a16="http://schemas.microsoft.com/office/drawing/2014/main" val="10004"/>
-                  </a:ext>
-                </a:extLst>
-              </a:tr>
-              <a:tr h="239450">
-                <a:tc>
-                  <a:txBody>
-                    <a:bodyPr/>
-                    <a:lstStyle/>
-                    <a:p>
-                      <a:pPr marL="0" lvl="0" indent="0" algn="l" rtl="0">
-                        <a:spcBef>
-                          <a:spcPts val="0"/>
-                        </a:spcBef>
-                        <a:spcAft>
-                          <a:spcPts val="0"/>
-                        </a:spcAft>
-                        <a:buClr>
-                          <a:schemeClr val="dk1"/>
-                        </a:buClr>
-                        <a:buSzPts val="1100"/>
-                        <a:buFont typeface="Arial"/>
-                        <a:buNone/>
-                      </a:pPr>
-                      <a:r>
-                        <a:rPr lang="de" sz="1100"/>
-                        <a:t>Location/Action</a:t>
-                      </a:r>
-                      <a:endParaRPr sz="1100" u="none" strike="noStrike" cap="none"/>
-                    </a:p>
-                  </a:txBody>
-                  <a:tcPr marL="68600" marR="68600" marT="34300" marB="34300">
-                    <a:noFill/>
-                  </a:tcPr>
-                </a:tc>
-                <a:tc>
-                  <a:txBody>
-                    <a:bodyPr/>
-                    <a:lstStyle/>
-                    <a:p>
-                      <a:pPr marL="0" marR="0" lvl="0" indent="0" algn="l" rtl="0">
-                        <a:lnSpc>
-                          <a:spcPct val="100000"/>
-                        </a:lnSpc>
-                        <a:spcBef>
-                          <a:spcPts val="0"/>
-                        </a:spcBef>
-                        <a:spcAft>
-                          <a:spcPts val="0"/>
-                        </a:spcAft>
-                        <a:buClr>
-                          <a:srgbClr val="000000"/>
-                        </a:buClr>
-                        <a:buSzPts val="1100"/>
-                        <a:buFont typeface="Arial"/>
-                        <a:buNone/>
-                      </a:pPr>
-                      <a:endParaRPr sz="1100" u="none" strike="noStrike" cap="none"/>
-                    </a:p>
-                  </a:txBody>
-                  <a:tcPr marL="68600" marR="68600" marT="34300" marB="34300">
-                    <a:noFill/>
-                  </a:tcPr>
-                </a:tc>
-                <a:tc>
-                  <a:txBody>
-                    <a:bodyPr/>
-                    <a:lstStyle/>
-                    <a:p>
-                      <a:pPr marL="0" marR="0" lvl="0" indent="0" algn="l" rtl="0">
-                        <a:lnSpc>
-                          <a:spcPct val="100000"/>
-                        </a:lnSpc>
-                        <a:spcBef>
-                          <a:spcPts val="0"/>
-                        </a:spcBef>
-                        <a:spcAft>
-                          <a:spcPts val="0"/>
-                        </a:spcAft>
-                        <a:buClr>
-                          <a:srgbClr val="000000"/>
-                        </a:buClr>
-                        <a:buSzPts val="1100"/>
-                        <a:buFont typeface="Arial"/>
-                        <a:buNone/>
-                      </a:pPr>
-                      <a:endParaRPr sz="1100" u="none" strike="noStrike" cap="none"/>
-                    </a:p>
-                  </a:txBody>
-                  <a:tcPr marL="68600" marR="68600" marT="34300" marB="34300">
-                    <a:noFill/>
-                  </a:tcPr>
-                </a:tc>
-                <a:extLst>
-                  <a:ext uri="{0D108BD9-81ED-4DB2-BD59-A6C34878D82A}">
-                    <a16:rowId xmlns:a16="http://schemas.microsoft.com/office/drawing/2014/main" val="10005"/>
-                  </a:ext>
-                </a:extLst>
-              </a:tr>
-              <a:tr h="239450">
-                <a:tc>
-                  <a:txBody>
-                    <a:bodyPr/>
-                    <a:lstStyle/>
-                    <a:p>
-                      <a:pPr marL="0" lvl="0" indent="0" algn="l" rtl="0">
-                        <a:spcBef>
-                          <a:spcPts val="0"/>
-                        </a:spcBef>
-                        <a:spcAft>
-                          <a:spcPts val="0"/>
-                        </a:spcAft>
-                        <a:buClr>
-                          <a:schemeClr val="dk1"/>
-                        </a:buClr>
-                        <a:buSzPts val="1100"/>
-                        <a:buFont typeface="Arial"/>
-                        <a:buNone/>
-                      </a:pPr>
-                      <a:r>
-                        <a:rPr lang="de" sz="1100"/>
-                        <a:t>Location/Action</a:t>
-                      </a:r>
-                      <a:endParaRPr sz="1100" u="none" strike="noStrike" cap="none"/>
-                    </a:p>
-                  </a:txBody>
-                  <a:tcPr marL="68600" marR="68600" marT="34300" marB="34300">
-                    <a:noFill/>
-                  </a:tcPr>
-                </a:tc>
-                <a:tc>
-                  <a:txBody>
-                    <a:bodyPr/>
-                    <a:lstStyle/>
-                    <a:p>
-                      <a:pPr marL="0" marR="0" lvl="0" indent="0" algn="l" rtl="0">
-                        <a:lnSpc>
-                          <a:spcPct val="100000"/>
-                        </a:lnSpc>
-                        <a:spcBef>
-                          <a:spcPts val="0"/>
-                        </a:spcBef>
-                        <a:spcAft>
-                          <a:spcPts val="0"/>
-                        </a:spcAft>
-                        <a:buClr>
-                          <a:srgbClr val="000000"/>
-                        </a:buClr>
-                        <a:buSzPts val="1100"/>
-                        <a:buFont typeface="Arial"/>
-                        <a:buNone/>
-                      </a:pPr>
-                      <a:endParaRPr sz="1100" u="none" strike="noStrike" cap="none"/>
-                    </a:p>
-                  </a:txBody>
-                  <a:tcPr marL="68600" marR="68600" marT="34300" marB="34300">
-                    <a:noFill/>
-                  </a:tcPr>
-                </a:tc>
-                <a:tc>
-                  <a:txBody>
-                    <a:bodyPr/>
-                    <a:lstStyle/>
-                    <a:p>
-                      <a:pPr marL="0" marR="0" lvl="0" indent="0" algn="l" rtl="0">
-                        <a:lnSpc>
-                          <a:spcPct val="100000"/>
-                        </a:lnSpc>
-                        <a:spcBef>
-                          <a:spcPts val="0"/>
-                        </a:spcBef>
-                        <a:spcAft>
-                          <a:spcPts val="0"/>
-                        </a:spcAft>
-                        <a:buClr>
-                          <a:srgbClr val="000000"/>
-                        </a:buClr>
-                        <a:buSzPts val="1100"/>
-                        <a:buFont typeface="Arial"/>
-                        <a:buNone/>
-                      </a:pPr>
-                      <a:endParaRPr sz="1100" u="none" strike="noStrike" cap="none"/>
-                    </a:p>
-                  </a:txBody>
-                  <a:tcPr marL="68600" marR="68600" marT="34300" marB="34300">
-                    <a:noFill/>
-                  </a:tcPr>
-                </a:tc>
-                <a:extLst>
-                  <a:ext uri="{0D108BD9-81ED-4DB2-BD59-A6C34878D82A}">
-                    <a16:rowId xmlns:a16="http://schemas.microsoft.com/office/drawing/2014/main" val="10006"/>
-                  </a:ext>
-                </a:extLst>
-              </a:tr>
-              <a:tr h="239450">
-                <a:tc>
-                  <a:txBody>
-                    <a:bodyPr/>
-                    <a:lstStyle/>
-                    <a:p>
-                      <a:pPr marL="0" marR="0" lvl="0" indent="0" algn="ctr" rtl="0">
-                        <a:lnSpc>
-                          <a:spcPct val="100000"/>
-                        </a:lnSpc>
-                        <a:spcBef>
-                          <a:spcPts val="0"/>
-                        </a:spcBef>
-                        <a:spcAft>
-                          <a:spcPts val="0"/>
-                        </a:spcAft>
-                        <a:buClr>
-                          <a:srgbClr val="000000"/>
-                        </a:buClr>
-                        <a:buSzPts val="1100"/>
-                        <a:buFont typeface="Arial"/>
-                        <a:buNone/>
-                      </a:pPr>
-                      <a:r>
-                        <a:rPr lang="de" sz="1100" b="1" u="none" strike="noStrike" cap="none">
-                          <a:solidFill>
-                            <a:schemeClr val="dk1"/>
-                          </a:solidFill>
-                        </a:rPr>
-                        <a:t>Character: (Name)</a:t>
-                      </a:r>
-                      <a:endParaRPr sz="1100" u="none" strike="noStrike" cap="none"/>
-                    </a:p>
-                  </a:txBody>
-                  <a:tcPr marL="68600" marR="68600" marT="34300" marB="34300">
-                    <a:solidFill>
-                      <a:srgbClr val="FFC000"/>
-                    </a:solidFill>
-                  </a:tcPr>
-                </a:tc>
-                <a:tc>
-                  <a:txBody>
-                    <a:bodyPr/>
-                    <a:lstStyle/>
-                    <a:p>
-                      <a:pPr marL="0" marR="0" lvl="0" indent="0" algn="ctr" rtl="0">
-                        <a:lnSpc>
-                          <a:spcPct val="100000"/>
-                        </a:lnSpc>
-                        <a:spcBef>
-                          <a:spcPts val="0"/>
-                        </a:spcBef>
-                        <a:spcAft>
-                          <a:spcPts val="0"/>
-                        </a:spcAft>
-                        <a:buClr>
-                          <a:srgbClr val="000000"/>
-                        </a:buClr>
-                        <a:buSzPts val="1100"/>
-                        <a:buFont typeface="Arial"/>
-                        <a:buNone/>
-                      </a:pPr>
-                      <a:r>
-                        <a:rPr lang="de" sz="1100" b="1" u="none" strike="noStrike" cap="none">
-                          <a:solidFill>
-                            <a:schemeClr val="dk1"/>
-                          </a:solidFill>
-                        </a:rPr>
-                        <a:t>DIALOGUE BARK – </a:t>
-                      </a:r>
-                      <a:r>
-                        <a:rPr lang="de" sz="1100" b="1"/>
-                        <a:t>Situation </a:t>
-                      </a:r>
-                      <a:r>
-                        <a:rPr lang="de" sz="1100" b="1" u="none" strike="noStrike" cap="none">
-                          <a:solidFill>
-                            <a:schemeClr val="dk1"/>
-                          </a:solidFill>
-                        </a:rPr>
-                        <a:t> v01</a:t>
-                      </a:r>
-                      <a:endParaRPr sz="1100" u="none" strike="noStrike" cap="none"/>
-                    </a:p>
-                  </a:txBody>
-                  <a:tcPr marL="68600" marR="68600" marT="34300" marB="34300">
-                    <a:solidFill>
-                      <a:srgbClr val="FFC000"/>
-                    </a:solidFill>
-                  </a:tcPr>
-                </a:tc>
-                <a:tc>
-                  <a:txBody>
-                    <a:bodyPr/>
-                    <a:lstStyle/>
-                    <a:p>
-                      <a:pPr marL="0" marR="0" lvl="0" indent="0" algn="ctr" rtl="0">
-                        <a:lnSpc>
-                          <a:spcPct val="100000"/>
-                        </a:lnSpc>
-                        <a:spcBef>
-                          <a:spcPts val="0"/>
-                        </a:spcBef>
-                        <a:spcAft>
-                          <a:spcPts val="0"/>
-                        </a:spcAft>
-                        <a:buClr>
-                          <a:schemeClr val="dk1"/>
-                        </a:buClr>
-                        <a:buSzPts val="1100"/>
-                        <a:buFont typeface="Arial"/>
-                        <a:buNone/>
-                      </a:pPr>
-                      <a:r>
-                        <a:rPr lang="de" sz="1100" b="1" u="none" strike="noStrike" cap="none">
-                          <a:solidFill>
-                            <a:schemeClr val="dk1"/>
-                          </a:solidFill>
-                        </a:rPr>
-                        <a:t>DIALOGUE BARK – </a:t>
-                      </a:r>
-                      <a:r>
-                        <a:rPr lang="de" sz="1100" b="1"/>
-                        <a:t>Situation </a:t>
-                      </a:r>
-                      <a:r>
-                        <a:rPr lang="de" sz="1100" b="1" u="none" strike="noStrike" cap="none">
-                          <a:solidFill>
-                            <a:schemeClr val="dk1"/>
-                          </a:solidFill>
-                        </a:rPr>
-                        <a:t> v02</a:t>
-                      </a:r>
-                      <a:endParaRPr sz="1100" u="none" strike="noStrike" cap="none"/>
-                    </a:p>
-                  </a:txBody>
-                  <a:tcPr marL="68600" marR="68600" marT="34300" marB="34300">
-                    <a:solidFill>
-                      <a:srgbClr val="FFC000"/>
-                    </a:solidFill>
-                  </a:tcPr>
-                </a:tc>
-                <a:extLst>
-                  <a:ext uri="{0D108BD9-81ED-4DB2-BD59-A6C34878D82A}">
-                    <a16:rowId xmlns:a16="http://schemas.microsoft.com/office/drawing/2014/main" val="10007"/>
-                  </a:ext>
-                </a:extLst>
-              </a:tr>
-              <a:tr h="239450">
-                <a:tc>
-                  <a:txBody>
-                    <a:bodyPr/>
-                    <a:lstStyle/>
-                    <a:p>
-                      <a:pPr marL="0" lvl="0" indent="0" algn="l" rtl="0">
-                        <a:spcBef>
-                          <a:spcPts val="0"/>
-                        </a:spcBef>
-                        <a:spcAft>
-                          <a:spcPts val="0"/>
-                        </a:spcAft>
-                        <a:buClr>
-                          <a:schemeClr val="dk1"/>
-                        </a:buClr>
-                        <a:buSzPts val="1100"/>
-                        <a:buFont typeface="Arial"/>
-                        <a:buNone/>
-                      </a:pPr>
-                      <a:r>
-                        <a:rPr lang="de" sz="1100"/>
-                        <a:t>Location/Action</a:t>
-                      </a:r>
-                      <a:endParaRPr sz="1100" u="none" strike="noStrike" cap="none"/>
-                    </a:p>
-                  </a:txBody>
-                  <a:tcPr marL="68600" marR="68600" marT="34300" marB="34300">
-                    <a:noFill/>
-                  </a:tcPr>
-                </a:tc>
-                <a:tc>
-                  <a:txBody>
-                    <a:bodyPr/>
-                    <a:lstStyle/>
-                    <a:p>
-                      <a:pPr marL="0" marR="0" lvl="0" indent="0" algn="l" rtl="0">
-                        <a:lnSpc>
-                          <a:spcPct val="100000"/>
-                        </a:lnSpc>
-                        <a:spcBef>
-                          <a:spcPts val="0"/>
-                        </a:spcBef>
-                        <a:spcAft>
-                          <a:spcPts val="0"/>
-                        </a:spcAft>
-                        <a:buClr>
-                          <a:srgbClr val="000000"/>
-                        </a:buClr>
-                        <a:buSzPts val="1100"/>
-                        <a:buFont typeface="Arial"/>
-                        <a:buNone/>
-                      </a:pPr>
-                      <a:endParaRPr sz="1100" u="none" strike="noStrike" cap="none"/>
-                    </a:p>
-                  </a:txBody>
-                  <a:tcPr marL="68600" marR="68600" marT="34300" marB="34300">
-                    <a:noFill/>
-                  </a:tcPr>
-                </a:tc>
-                <a:tc>
-                  <a:txBody>
-                    <a:bodyPr/>
-                    <a:lstStyle/>
-                    <a:p>
-                      <a:pPr marL="0" marR="0" lvl="0" indent="0" algn="l" rtl="0">
-                        <a:lnSpc>
-                          <a:spcPct val="100000"/>
-                        </a:lnSpc>
-                        <a:spcBef>
-                          <a:spcPts val="0"/>
-                        </a:spcBef>
-                        <a:spcAft>
-                          <a:spcPts val="0"/>
-                        </a:spcAft>
-                        <a:buClr>
-                          <a:srgbClr val="000000"/>
-                        </a:buClr>
-                        <a:buSzPts val="1100"/>
-                        <a:buFont typeface="Arial"/>
-                        <a:buNone/>
-                      </a:pPr>
-                      <a:endParaRPr sz="1100" u="none" strike="noStrike" cap="none"/>
-                    </a:p>
-                  </a:txBody>
-                  <a:tcPr marL="68600" marR="68600" marT="34300" marB="34300">
-                    <a:noFill/>
-                  </a:tcPr>
-                </a:tc>
-                <a:extLst>
-                  <a:ext uri="{0D108BD9-81ED-4DB2-BD59-A6C34878D82A}">
-                    <a16:rowId xmlns:a16="http://schemas.microsoft.com/office/drawing/2014/main" val="10008"/>
-                  </a:ext>
-                </a:extLst>
-              </a:tr>
-              <a:tr h="239450">
-                <a:tc>
-                  <a:txBody>
-                    <a:bodyPr/>
-                    <a:lstStyle/>
-                    <a:p>
-                      <a:pPr marL="0" lvl="0" indent="0" algn="l" rtl="0">
-                        <a:spcBef>
-                          <a:spcPts val="0"/>
-                        </a:spcBef>
-                        <a:spcAft>
-                          <a:spcPts val="0"/>
-                        </a:spcAft>
-                        <a:buClr>
-                          <a:schemeClr val="dk1"/>
-                        </a:buClr>
-                        <a:buSzPts val="1100"/>
-                        <a:buFont typeface="Arial"/>
-                        <a:buNone/>
-                      </a:pPr>
-                      <a:r>
-                        <a:rPr lang="de" sz="1100"/>
-                        <a:t>Location/Action</a:t>
-                      </a:r>
-                      <a:endParaRPr sz="1100" u="none" strike="noStrike" cap="none"/>
-                    </a:p>
-                  </a:txBody>
-                  <a:tcPr marL="68600" marR="68600" marT="34300" marB="34300">
-                    <a:noFill/>
-                  </a:tcPr>
-                </a:tc>
-                <a:tc>
-                  <a:txBody>
-                    <a:bodyPr/>
-                    <a:lstStyle/>
-                    <a:p>
-                      <a:pPr marL="0" marR="0" lvl="0" indent="0" algn="l" rtl="0">
-                        <a:lnSpc>
-                          <a:spcPct val="100000"/>
-                        </a:lnSpc>
-                        <a:spcBef>
-                          <a:spcPts val="0"/>
-                        </a:spcBef>
-                        <a:spcAft>
-                          <a:spcPts val="0"/>
-                        </a:spcAft>
-                        <a:buClr>
-                          <a:srgbClr val="000000"/>
-                        </a:buClr>
-                        <a:buSzPts val="1100"/>
-                        <a:buFont typeface="Arial"/>
-                        <a:buNone/>
-                      </a:pPr>
-                      <a:endParaRPr sz="1100" u="none" strike="noStrike" cap="none"/>
-                    </a:p>
-                  </a:txBody>
-                  <a:tcPr marL="68600" marR="68600" marT="34300" marB="34300">
-                    <a:noFill/>
-                  </a:tcPr>
-                </a:tc>
-                <a:tc>
-                  <a:txBody>
-                    <a:bodyPr/>
-                    <a:lstStyle/>
-                    <a:p>
-                      <a:pPr marL="0" marR="0" lvl="0" indent="0" algn="l" rtl="0">
-                        <a:lnSpc>
-                          <a:spcPct val="100000"/>
-                        </a:lnSpc>
-                        <a:spcBef>
-                          <a:spcPts val="0"/>
-                        </a:spcBef>
-                        <a:spcAft>
-                          <a:spcPts val="0"/>
-                        </a:spcAft>
-                        <a:buClr>
-                          <a:srgbClr val="000000"/>
-                        </a:buClr>
-                        <a:buSzPts val="1100"/>
-                        <a:buFont typeface="Arial"/>
-                        <a:buNone/>
-                      </a:pPr>
-                      <a:endParaRPr sz="1100" u="none" strike="noStrike" cap="none"/>
-                    </a:p>
-                  </a:txBody>
-                  <a:tcPr marL="68600" marR="68600" marT="34300" marB="34300">
-                    <a:noFill/>
-                  </a:tcPr>
-                </a:tc>
-                <a:extLst>
-                  <a:ext uri="{0D108BD9-81ED-4DB2-BD59-A6C34878D82A}">
-                    <a16:rowId xmlns:a16="http://schemas.microsoft.com/office/drawing/2014/main" val="10009"/>
-                  </a:ext>
-                </a:extLst>
-              </a:tr>
-              <a:tr h="239450">
-                <a:tc>
-                  <a:txBody>
-                    <a:bodyPr/>
-                    <a:lstStyle/>
-                    <a:p>
-                      <a:pPr marL="0" lvl="0" indent="0" algn="l" rtl="0">
-                        <a:spcBef>
-                          <a:spcPts val="0"/>
-                        </a:spcBef>
-                        <a:spcAft>
-                          <a:spcPts val="0"/>
-                        </a:spcAft>
-                        <a:buClr>
-                          <a:schemeClr val="dk1"/>
-                        </a:buClr>
-                        <a:buSzPts val="1100"/>
-                        <a:buFont typeface="Arial"/>
-                        <a:buNone/>
-                      </a:pPr>
-                      <a:r>
-                        <a:rPr lang="de" sz="1100"/>
-                        <a:t>Location/Action</a:t>
-                      </a:r>
-                      <a:endParaRPr sz="1100" u="none" strike="noStrike" cap="none"/>
-                    </a:p>
-                  </a:txBody>
-                  <a:tcPr marL="68600" marR="68600" marT="34300" marB="34300">
-                    <a:noFill/>
-                  </a:tcPr>
-                </a:tc>
-                <a:tc>
-                  <a:txBody>
-                    <a:bodyPr/>
-                    <a:lstStyle/>
-                    <a:p>
-                      <a:pPr marL="0" marR="0" lvl="0" indent="0" algn="l" rtl="0">
-                        <a:lnSpc>
-                          <a:spcPct val="100000"/>
-                        </a:lnSpc>
-                        <a:spcBef>
-                          <a:spcPts val="0"/>
-                        </a:spcBef>
-                        <a:spcAft>
-                          <a:spcPts val="0"/>
-                        </a:spcAft>
-                        <a:buClr>
-                          <a:srgbClr val="000000"/>
-                        </a:buClr>
-                        <a:buSzPts val="1100"/>
-                        <a:buFont typeface="Arial"/>
-                        <a:buNone/>
-                      </a:pPr>
-                      <a:endParaRPr sz="1100" u="none" strike="noStrike" cap="none"/>
-                    </a:p>
-                  </a:txBody>
-                  <a:tcPr marL="68600" marR="68600" marT="34300" marB="34300">
-                    <a:noFill/>
-                  </a:tcPr>
-                </a:tc>
-                <a:tc>
-                  <a:txBody>
-                    <a:bodyPr/>
-                    <a:lstStyle/>
-                    <a:p>
-                      <a:pPr marL="0" marR="0" lvl="0" indent="0" algn="l" rtl="0">
-                        <a:lnSpc>
-                          <a:spcPct val="100000"/>
-                        </a:lnSpc>
-                        <a:spcBef>
-                          <a:spcPts val="0"/>
-                        </a:spcBef>
-                        <a:spcAft>
-                          <a:spcPts val="0"/>
-                        </a:spcAft>
-                        <a:buClr>
-                          <a:srgbClr val="000000"/>
-                        </a:buClr>
-                        <a:buSzPts val="1100"/>
-                        <a:buFont typeface="Arial"/>
-                        <a:buNone/>
-                      </a:pPr>
-                      <a:endParaRPr sz="1100" u="none" strike="noStrike" cap="none"/>
-                    </a:p>
-                  </a:txBody>
-                  <a:tcPr marL="68600" marR="68600" marT="34300" marB="34300">
-                    <a:noFill/>
-                  </a:tcPr>
-                </a:tc>
-                <a:extLst>
-                  <a:ext uri="{0D108BD9-81ED-4DB2-BD59-A6C34878D82A}">
-                    <a16:rowId xmlns:a16="http://schemas.microsoft.com/office/drawing/2014/main" val="10010"/>
-                  </a:ext>
-                </a:extLst>
-              </a:tr>
-              <a:tr h="239450">
-                <a:tc>
-                  <a:txBody>
-                    <a:bodyPr/>
-                    <a:lstStyle/>
-                    <a:p>
-                      <a:pPr marL="0" lvl="0" indent="0" algn="l" rtl="0">
-                        <a:spcBef>
-                          <a:spcPts val="0"/>
-                        </a:spcBef>
-                        <a:spcAft>
-                          <a:spcPts val="0"/>
-                        </a:spcAft>
-                        <a:buClr>
-                          <a:schemeClr val="dk1"/>
-                        </a:buClr>
-                        <a:buSzPts val="1100"/>
-                        <a:buFont typeface="Arial"/>
-                        <a:buNone/>
-                      </a:pPr>
-                      <a:r>
-                        <a:rPr lang="de" sz="1100"/>
-                        <a:t>Location/Action</a:t>
-                      </a:r>
-                      <a:endParaRPr sz="1100" u="none" strike="noStrike" cap="none"/>
-                    </a:p>
-                  </a:txBody>
-                  <a:tcPr marL="68600" marR="68600" marT="34300" marB="34300">
-                    <a:noFill/>
-                  </a:tcPr>
-                </a:tc>
-                <a:tc>
-                  <a:txBody>
-                    <a:bodyPr/>
-                    <a:lstStyle/>
-                    <a:p>
-                      <a:pPr marL="0" marR="0" lvl="0" indent="0" algn="l" rtl="0">
-                        <a:lnSpc>
-                          <a:spcPct val="100000"/>
-                        </a:lnSpc>
-                        <a:spcBef>
-                          <a:spcPts val="0"/>
-                        </a:spcBef>
-                        <a:spcAft>
-                          <a:spcPts val="0"/>
-                        </a:spcAft>
-                        <a:buClr>
-                          <a:srgbClr val="000000"/>
-                        </a:buClr>
-                        <a:buSzPts val="1100"/>
-                        <a:buFont typeface="Arial"/>
-                        <a:buNone/>
-                      </a:pPr>
-                      <a:endParaRPr sz="1100" u="none" strike="noStrike" cap="none"/>
-                    </a:p>
-                  </a:txBody>
-                  <a:tcPr marL="68600" marR="68600" marT="34300" marB="34300">
-                    <a:noFill/>
-                  </a:tcPr>
-                </a:tc>
-                <a:tc>
-                  <a:txBody>
-                    <a:bodyPr/>
-                    <a:lstStyle/>
-                    <a:p>
-                      <a:pPr marL="0" marR="0" lvl="0" indent="0" algn="l" rtl="0">
-                        <a:lnSpc>
-                          <a:spcPct val="100000"/>
-                        </a:lnSpc>
-                        <a:spcBef>
-                          <a:spcPts val="0"/>
-                        </a:spcBef>
-                        <a:spcAft>
-                          <a:spcPts val="0"/>
-                        </a:spcAft>
-                        <a:buClr>
-                          <a:srgbClr val="000000"/>
-                        </a:buClr>
-                        <a:buSzPts val="1100"/>
-                        <a:buFont typeface="Arial"/>
-                        <a:buNone/>
-                      </a:pPr>
-                      <a:endParaRPr sz="1100" u="none" strike="noStrike" cap="none"/>
-                    </a:p>
-                  </a:txBody>
-                  <a:tcPr marL="68600" marR="68600" marT="34300" marB="34300">
-                    <a:noFill/>
-                  </a:tcPr>
-                </a:tc>
-                <a:extLst>
-                  <a:ext uri="{0D108BD9-81ED-4DB2-BD59-A6C34878D82A}">
-                    <a16:rowId xmlns:a16="http://schemas.microsoft.com/office/drawing/2014/main" val="10011"/>
-                  </a:ext>
-                </a:extLst>
-              </a:tr>
-              <a:tr h="239450">
-                <a:tc>
-                  <a:txBody>
-                    <a:bodyPr/>
-                    <a:lstStyle/>
-                    <a:p>
-                      <a:pPr marL="0" lvl="0" indent="0" algn="l" rtl="0">
-                        <a:spcBef>
-                          <a:spcPts val="0"/>
-                        </a:spcBef>
-                        <a:spcAft>
-                          <a:spcPts val="0"/>
-                        </a:spcAft>
-                        <a:buClr>
-                          <a:schemeClr val="dk1"/>
-                        </a:buClr>
-                        <a:buSzPts val="1100"/>
-                        <a:buFont typeface="Arial"/>
-                        <a:buNone/>
-                      </a:pPr>
-                      <a:r>
-                        <a:rPr lang="de" sz="1100"/>
-                        <a:t>Location/Action</a:t>
-                      </a:r>
-                      <a:endParaRPr sz="1100" u="none" strike="noStrike" cap="none"/>
-                    </a:p>
-                  </a:txBody>
-                  <a:tcPr marL="68600" marR="68600" marT="34300" marB="34300">
-                    <a:noFill/>
-                  </a:tcPr>
-                </a:tc>
-                <a:tc>
-                  <a:txBody>
-                    <a:bodyPr/>
-                    <a:lstStyle/>
-                    <a:p>
-                      <a:pPr marL="0" marR="0" lvl="0" indent="0" algn="l" rtl="0">
-                        <a:lnSpc>
-                          <a:spcPct val="100000"/>
-                        </a:lnSpc>
-                        <a:spcBef>
-                          <a:spcPts val="0"/>
-                        </a:spcBef>
-                        <a:spcAft>
-                          <a:spcPts val="0"/>
-                        </a:spcAft>
-                        <a:buClr>
-                          <a:srgbClr val="000000"/>
-                        </a:buClr>
-                        <a:buSzPts val="900"/>
-                        <a:buFont typeface="Arial"/>
-                        <a:buNone/>
-                      </a:pPr>
-                      <a:endParaRPr sz="900" u="none" strike="noStrike" cap="none"/>
-                    </a:p>
-                  </a:txBody>
-                  <a:tcPr marL="68600" marR="68600" marT="34300" marB="34300">
-                    <a:noFill/>
-                  </a:tcPr>
-                </a:tc>
-                <a:tc>
-                  <a:txBody>
-                    <a:bodyPr/>
-                    <a:lstStyle/>
-                    <a:p>
-                      <a:pPr marL="0" marR="0" lvl="0" indent="0" algn="l" rtl="0">
-                        <a:lnSpc>
-                          <a:spcPct val="100000"/>
-                        </a:lnSpc>
-                        <a:spcBef>
-                          <a:spcPts val="0"/>
-                        </a:spcBef>
-                        <a:spcAft>
-                          <a:spcPts val="0"/>
-                        </a:spcAft>
-                        <a:buClr>
-                          <a:srgbClr val="000000"/>
-                        </a:buClr>
-                        <a:buSzPts val="900"/>
-                        <a:buFont typeface="Arial"/>
-                        <a:buNone/>
-                      </a:pPr>
-                      <a:endParaRPr sz="900" u="none" strike="noStrike" cap="none"/>
-                    </a:p>
-                  </a:txBody>
-                  <a:tcPr marL="68600" marR="68600" marT="34300" marB="34300">
-                    <a:noFill/>
-                  </a:tcPr>
-                </a:tc>
-                <a:extLst>
-                  <a:ext uri="{0D108BD9-81ED-4DB2-BD59-A6C34878D82A}">
-                    <a16:rowId xmlns:a16="http://schemas.microsoft.com/office/drawing/2014/main" val="10012"/>
-                  </a:ext>
-                </a:extLst>
-              </a:tr>
-              <a:tr h="239450">
-                <a:tc>
-                  <a:txBody>
-                    <a:bodyPr/>
-                    <a:lstStyle/>
-                    <a:p>
-                      <a:pPr marL="0" lvl="0" indent="0" algn="l" rtl="0">
-                        <a:spcBef>
-                          <a:spcPts val="0"/>
-                        </a:spcBef>
-                        <a:spcAft>
-                          <a:spcPts val="0"/>
-                        </a:spcAft>
-                        <a:buClr>
-                          <a:schemeClr val="dk1"/>
-                        </a:buClr>
-                        <a:buSzPts val="1100"/>
-                        <a:buFont typeface="Arial"/>
-                        <a:buNone/>
-                      </a:pPr>
-                      <a:r>
-                        <a:rPr lang="de" sz="1100"/>
-                        <a:t>Location/Action</a:t>
-                      </a:r>
-                      <a:endParaRPr sz="1100" u="none" strike="noStrike" cap="none"/>
-                    </a:p>
-                  </a:txBody>
-                  <a:tcPr marL="68600" marR="68600" marT="34300" marB="34300">
-                    <a:noFill/>
-                  </a:tcPr>
-                </a:tc>
-                <a:tc>
-                  <a:txBody>
-                    <a:bodyPr/>
-                    <a:lstStyle/>
-                    <a:p>
-                      <a:pPr marL="0" marR="0" lvl="0" indent="0" algn="l" rtl="0">
-                        <a:lnSpc>
-                          <a:spcPct val="100000"/>
-                        </a:lnSpc>
-                        <a:spcBef>
-                          <a:spcPts val="0"/>
-                        </a:spcBef>
-                        <a:spcAft>
-                          <a:spcPts val="0"/>
-                        </a:spcAft>
-                        <a:buClr>
-                          <a:srgbClr val="000000"/>
-                        </a:buClr>
-                        <a:buSzPts val="900"/>
-                        <a:buFont typeface="Arial"/>
-                        <a:buNone/>
-                      </a:pPr>
-                      <a:endParaRPr sz="900" u="none" strike="noStrike" cap="none"/>
-                    </a:p>
-                  </a:txBody>
-                  <a:tcPr marL="68600" marR="68600" marT="34300" marB="34300">
-                    <a:noFill/>
-                  </a:tcPr>
-                </a:tc>
-                <a:tc>
-                  <a:txBody>
-                    <a:bodyPr/>
-                    <a:lstStyle/>
-                    <a:p>
-                      <a:pPr marL="0" marR="0" lvl="0" indent="0" algn="l" rtl="0">
-                        <a:lnSpc>
-                          <a:spcPct val="100000"/>
-                        </a:lnSpc>
-                        <a:spcBef>
-                          <a:spcPts val="0"/>
-                        </a:spcBef>
-                        <a:spcAft>
-                          <a:spcPts val="0"/>
-                        </a:spcAft>
-                        <a:buClr>
-                          <a:srgbClr val="000000"/>
-                        </a:buClr>
-                        <a:buSzPts val="900"/>
-                        <a:buFont typeface="Arial"/>
-                        <a:buNone/>
-                      </a:pPr>
-                      <a:endParaRPr sz="900" u="none" strike="noStrike" cap="none"/>
-                    </a:p>
-                  </a:txBody>
-                  <a:tcPr marL="68600" marR="68600" marT="34300" marB="34300">
-                    <a:noFill/>
-                  </a:tcPr>
-                </a:tc>
-                <a:extLst>
-                  <a:ext uri="{0D108BD9-81ED-4DB2-BD59-A6C34878D82A}">
-                    <a16:rowId xmlns:a16="http://schemas.microsoft.com/office/drawing/2014/main" val="10013"/>
-                  </a:ext>
-                </a:extLst>
-              </a:tr>
-              <a:tr h="239450">
-                <a:tc>
-                  <a:txBody>
-                    <a:bodyPr/>
-                    <a:lstStyle/>
-                    <a:p>
-                      <a:pPr marL="0" marR="0" lvl="0" indent="0" algn="ctr" rtl="0">
-                        <a:lnSpc>
-                          <a:spcPct val="100000"/>
-                        </a:lnSpc>
-                        <a:spcBef>
-                          <a:spcPts val="0"/>
-                        </a:spcBef>
-                        <a:spcAft>
-                          <a:spcPts val="0"/>
-                        </a:spcAft>
-                        <a:buClr>
-                          <a:schemeClr val="dk1"/>
-                        </a:buClr>
-                        <a:buSzPts val="1100"/>
-                        <a:buFont typeface="Arial"/>
-                        <a:buNone/>
-                      </a:pPr>
-                      <a:r>
-                        <a:rPr lang="de" sz="1100" b="1" u="none" strike="noStrike" cap="none">
-                          <a:solidFill>
-                            <a:schemeClr val="dk1"/>
-                          </a:solidFill>
-                        </a:rPr>
-                        <a:t>Character: (Name)</a:t>
-                      </a:r>
-                      <a:endParaRPr sz="1100" u="none" strike="noStrike" cap="none"/>
-                    </a:p>
-                  </a:txBody>
-                  <a:tcPr marL="68600" marR="68600" marT="34300" marB="34300">
-                    <a:solidFill>
-                      <a:srgbClr val="FFC000"/>
-                    </a:solidFill>
-                  </a:tcPr>
-                </a:tc>
-                <a:tc>
-                  <a:txBody>
-                    <a:bodyPr/>
-                    <a:lstStyle/>
-                    <a:p>
-                      <a:pPr marL="0" marR="0" lvl="0" indent="0" algn="ctr" rtl="0">
-                        <a:lnSpc>
-                          <a:spcPct val="100000"/>
-                        </a:lnSpc>
-                        <a:spcBef>
-                          <a:spcPts val="0"/>
-                        </a:spcBef>
-                        <a:spcAft>
-                          <a:spcPts val="0"/>
-                        </a:spcAft>
-                        <a:buClr>
-                          <a:srgbClr val="000000"/>
-                        </a:buClr>
-                        <a:buSzPts val="1100"/>
-                        <a:buFont typeface="Arial"/>
-                        <a:buNone/>
-                      </a:pPr>
-                      <a:r>
-                        <a:rPr lang="de" sz="1100" b="1" u="none" strike="noStrike" cap="none">
-                          <a:solidFill>
-                            <a:schemeClr val="dk1"/>
-                          </a:solidFill>
-                        </a:rPr>
-                        <a:t>DIALOGUE BARK – </a:t>
-                      </a:r>
-                      <a:r>
-                        <a:rPr lang="de" sz="1100" b="1"/>
-                        <a:t>Situation </a:t>
-                      </a:r>
-                      <a:r>
-                        <a:rPr lang="de" sz="1100" b="1" u="none" strike="noStrike" cap="none">
-                          <a:solidFill>
-                            <a:schemeClr val="dk1"/>
-                          </a:solidFill>
-                        </a:rPr>
-                        <a:t> v01</a:t>
-                      </a:r>
-                      <a:endParaRPr sz="1100" u="none" strike="noStrike" cap="none"/>
-                    </a:p>
-                  </a:txBody>
-                  <a:tcPr marL="68600" marR="68600" marT="34300" marB="34300">
-                    <a:solidFill>
-                      <a:srgbClr val="FFC000"/>
-                    </a:solidFill>
-                  </a:tcPr>
-                </a:tc>
-                <a:tc>
-                  <a:txBody>
-                    <a:bodyPr/>
-                    <a:lstStyle/>
-                    <a:p>
-                      <a:pPr marL="0" marR="0" lvl="0" indent="0" algn="ctr" rtl="0">
-                        <a:lnSpc>
-                          <a:spcPct val="100000"/>
-                        </a:lnSpc>
-                        <a:spcBef>
-                          <a:spcPts val="0"/>
-                        </a:spcBef>
-                        <a:spcAft>
-                          <a:spcPts val="0"/>
-                        </a:spcAft>
-                        <a:buClr>
-                          <a:schemeClr val="dk1"/>
-                        </a:buClr>
-                        <a:buSzPts val="1100"/>
-                        <a:buFont typeface="Arial"/>
-                        <a:buNone/>
-                      </a:pPr>
-                      <a:r>
-                        <a:rPr lang="de" sz="1100" b="1" u="none" strike="noStrike" cap="none">
-                          <a:solidFill>
-                            <a:schemeClr val="dk1"/>
-                          </a:solidFill>
-                        </a:rPr>
-                        <a:t>DIALOGUE BARK – </a:t>
-                      </a:r>
-                      <a:r>
-                        <a:rPr lang="de" sz="1100" b="1"/>
-                        <a:t>Situation </a:t>
-                      </a:r>
-                      <a:r>
-                        <a:rPr lang="de" sz="1100" b="1" u="none" strike="noStrike" cap="none">
-                          <a:solidFill>
-                            <a:schemeClr val="dk1"/>
-                          </a:solidFill>
-                        </a:rPr>
-                        <a:t> v02</a:t>
-                      </a:r>
-                      <a:endParaRPr sz="1100" u="none" strike="noStrike" cap="none"/>
-                    </a:p>
-                  </a:txBody>
-                  <a:tcPr marL="68600" marR="68600" marT="34300" marB="34300">
-                    <a:solidFill>
-                      <a:srgbClr val="FFC000"/>
-                    </a:solidFill>
-                  </a:tcPr>
-                </a:tc>
-                <a:extLst>
-                  <a:ext uri="{0D108BD9-81ED-4DB2-BD59-A6C34878D82A}">
-                    <a16:rowId xmlns:a16="http://schemas.microsoft.com/office/drawing/2014/main" val="10014"/>
-                  </a:ext>
-                </a:extLst>
-              </a:tr>
-              <a:tr h="239450">
-                <a:tc>
-                  <a:txBody>
-                    <a:bodyPr/>
-                    <a:lstStyle/>
-                    <a:p>
-                      <a:pPr marL="0" lvl="0" indent="0" algn="l" rtl="0">
-                        <a:spcBef>
-                          <a:spcPts val="0"/>
-                        </a:spcBef>
-                        <a:spcAft>
-                          <a:spcPts val="0"/>
-                        </a:spcAft>
-                        <a:buClr>
-                          <a:schemeClr val="dk1"/>
-                        </a:buClr>
-                        <a:buSzPts val="1100"/>
-                        <a:buFont typeface="Arial"/>
-                        <a:buNone/>
-                      </a:pPr>
-                      <a:r>
-                        <a:rPr lang="de" sz="1100"/>
-                        <a:t>Location/Action</a:t>
-                      </a:r>
-                      <a:endParaRPr sz="1100" u="none" strike="noStrike" cap="none"/>
-                    </a:p>
-                  </a:txBody>
-                  <a:tcPr marL="68600" marR="68600" marT="34300" marB="34300">
-                    <a:noFill/>
-                  </a:tcPr>
-                </a:tc>
-                <a:tc>
-                  <a:txBody>
-                    <a:bodyPr/>
-                    <a:lstStyle/>
-                    <a:p>
-                      <a:pPr marL="0" marR="0" lvl="0" indent="0" algn="l" rtl="0">
-                        <a:lnSpc>
-                          <a:spcPct val="100000"/>
-                        </a:lnSpc>
-                        <a:spcBef>
-                          <a:spcPts val="0"/>
-                        </a:spcBef>
-                        <a:spcAft>
-                          <a:spcPts val="0"/>
-                        </a:spcAft>
-                        <a:buClr>
-                          <a:srgbClr val="000000"/>
-                        </a:buClr>
-                        <a:buSzPts val="900"/>
-                        <a:buFont typeface="Arial"/>
-                        <a:buNone/>
-                      </a:pPr>
-                      <a:endParaRPr sz="900" u="none" strike="noStrike" cap="none"/>
-                    </a:p>
-                  </a:txBody>
-                  <a:tcPr marL="68600" marR="68600" marT="34300" marB="34300">
-                    <a:noFill/>
-                  </a:tcPr>
-                </a:tc>
-                <a:tc>
-                  <a:txBody>
-                    <a:bodyPr/>
-                    <a:lstStyle/>
-                    <a:p>
-                      <a:pPr marL="0" marR="0" lvl="0" indent="0" algn="l" rtl="0">
-                        <a:lnSpc>
-                          <a:spcPct val="100000"/>
-                        </a:lnSpc>
-                        <a:spcBef>
-                          <a:spcPts val="0"/>
-                        </a:spcBef>
-                        <a:spcAft>
-                          <a:spcPts val="0"/>
-                        </a:spcAft>
-                        <a:buClr>
-                          <a:srgbClr val="000000"/>
-                        </a:buClr>
-                        <a:buSzPts val="900"/>
-                        <a:buFont typeface="Arial"/>
-                        <a:buNone/>
-                      </a:pPr>
-                      <a:endParaRPr sz="900" u="none" strike="noStrike" cap="none"/>
-                    </a:p>
-                  </a:txBody>
-                  <a:tcPr marL="68600" marR="68600" marT="34300" marB="34300">
-                    <a:noFill/>
-                  </a:tcPr>
-                </a:tc>
-                <a:extLst>
-                  <a:ext uri="{0D108BD9-81ED-4DB2-BD59-A6C34878D82A}">
-                    <a16:rowId xmlns:a16="http://schemas.microsoft.com/office/drawing/2014/main" val="10015"/>
-                  </a:ext>
-                </a:extLst>
-              </a:tr>
-              <a:tr h="239450">
-                <a:tc>
-                  <a:txBody>
-                    <a:bodyPr/>
-                    <a:lstStyle/>
-                    <a:p>
-                      <a:pPr marL="0" lvl="0" indent="0" algn="l" rtl="0">
-                        <a:spcBef>
-                          <a:spcPts val="0"/>
-                        </a:spcBef>
-                        <a:spcAft>
-                          <a:spcPts val="0"/>
-                        </a:spcAft>
-                        <a:buClr>
-                          <a:schemeClr val="dk1"/>
-                        </a:buClr>
-                        <a:buSzPts val="1100"/>
-                        <a:buFont typeface="Arial"/>
-                        <a:buNone/>
-                      </a:pPr>
-                      <a:r>
-                        <a:rPr lang="de" sz="1100" dirty="0"/>
-                        <a:t>Location/Action</a:t>
-                      </a:r>
-                      <a:endParaRPr sz="1100" u="none" strike="noStrike" cap="none" dirty="0"/>
-                    </a:p>
-                  </a:txBody>
-                  <a:tcPr marL="68600" marR="68600" marT="34300" marB="34300">
-                    <a:noFill/>
-                  </a:tcPr>
-                </a:tc>
-                <a:tc>
-                  <a:txBody>
-                    <a:bodyPr/>
-                    <a:lstStyle/>
-                    <a:p>
-                      <a:pPr marL="0" marR="0" lvl="0" indent="0" algn="l" rtl="0">
-                        <a:lnSpc>
-                          <a:spcPct val="100000"/>
-                        </a:lnSpc>
-                        <a:spcBef>
-                          <a:spcPts val="0"/>
-                        </a:spcBef>
-                        <a:spcAft>
-                          <a:spcPts val="0"/>
-                        </a:spcAft>
-                        <a:buClr>
-                          <a:srgbClr val="000000"/>
-                        </a:buClr>
-                        <a:buSzPts val="900"/>
-                        <a:buFont typeface="Arial"/>
-                        <a:buNone/>
-                      </a:pPr>
-                      <a:endParaRPr sz="900" u="none" strike="noStrike" cap="none"/>
-                    </a:p>
-                  </a:txBody>
-                  <a:tcPr marL="68600" marR="68600" marT="34300" marB="34300">
-                    <a:noFill/>
-                  </a:tcPr>
-                </a:tc>
-                <a:tc>
-                  <a:txBody>
-                    <a:bodyPr/>
-                    <a:lstStyle/>
-                    <a:p>
-                      <a:pPr marL="0" marR="0" lvl="0" indent="0" algn="l" rtl="0">
-                        <a:lnSpc>
-                          <a:spcPct val="100000"/>
-                        </a:lnSpc>
-                        <a:spcBef>
-                          <a:spcPts val="0"/>
-                        </a:spcBef>
-                        <a:spcAft>
-                          <a:spcPts val="0"/>
-                        </a:spcAft>
-                        <a:buClr>
-                          <a:srgbClr val="000000"/>
-                        </a:buClr>
-                        <a:buSzPts val="900"/>
-                        <a:buFont typeface="Arial"/>
-                        <a:buNone/>
-                      </a:pPr>
-                      <a:endParaRPr sz="900" u="none" strike="noStrike" cap="none"/>
-                    </a:p>
-                  </a:txBody>
-                  <a:tcPr marL="68600" marR="68600" marT="34300" marB="34300">
-                    <a:noFill/>
-                  </a:tcPr>
-                </a:tc>
-                <a:extLst>
-                  <a:ext uri="{0D108BD9-81ED-4DB2-BD59-A6C34878D82A}">
-                    <a16:rowId xmlns:a16="http://schemas.microsoft.com/office/drawing/2014/main" val="10016"/>
-                  </a:ext>
-                </a:extLst>
-              </a:tr>
-              <a:tr h="239450">
-                <a:tc>
-                  <a:txBody>
-                    <a:bodyPr/>
-                    <a:lstStyle/>
-                    <a:p>
-                      <a:pPr marL="0" lvl="0" indent="0" algn="l" rtl="0">
-                        <a:spcBef>
-                          <a:spcPts val="0"/>
-                        </a:spcBef>
-                        <a:spcAft>
-                          <a:spcPts val="0"/>
-                        </a:spcAft>
-                        <a:buClr>
-                          <a:schemeClr val="dk1"/>
-                        </a:buClr>
-                        <a:buSzPts val="1100"/>
-                        <a:buFont typeface="Arial"/>
-                        <a:buNone/>
-                      </a:pPr>
-                      <a:r>
-                        <a:rPr lang="de" sz="1100" dirty="0"/>
-                        <a:t>Location/Action</a:t>
-                      </a:r>
-                      <a:endParaRPr sz="1100" u="none" strike="noStrike" cap="none" dirty="0"/>
-                    </a:p>
-                  </a:txBody>
-                  <a:tcPr marL="68600" marR="68600" marT="34300" marB="34300">
-                    <a:noFill/>
-                  </a:tcPr>
-                </a:tc>
-                <a:tc>
-                  <a:txBody>
-                    <a:bodyPr/>
-                    <a:lstStyle/>
-                    <a:p>
-                      <a:pPr marL="0" marR="0" lvl="0" indent="0" algn="l" rtl="0">
-                        <a:lnSpc>
-                          <a:spcPct val="100000"/>
-                        </a:lnSpc>
-                        <a:spcBef>
-                          <a:spcPts val="0"/>
-                        </a:spcBef>
-                        <a:spcAft>
-                          <a:spcPts val="0"/>
-                        </a:spcAft>
-                        <a:buClr>
-                          <a:srgbClr val="000000"/>
-                        </a:buClr>
-                        <a:buSzPts val="900"/>
-                        <a:buFont typeface="Arial"/>
-                        <a:buNone/>
-                      </a:pPr>
-                      <a:endParaRPr sz="900" u="none" strike="noStrike" cap="none"/>
-                    </a:p>
-                  </a:txBody>
-                  <a:tcPr marL="68600" marR="68600" marT="34300" marB="34300">
-                    <a:noFill/>
-                  </a:tcPr>
-                </a:tc>
-                <a:tc>
-                  <a:txBody>
-                    <a:bodyPr/>
-                    <a:lstStyle/>
-                    <a:p>
-                      <a:pPr marL="0" marR="0" lvl="0" indent="0" algn="l" rtl="0">
-                        <a:lnSpc>
-                          <a:spcPct val="100000"/>
-                        </a:lnSpc>
-                        <a:spcBef>
-                          <a:spcPts val="0"/>
-                        </a:spcBef>
-                        <a:spcAft>
-                          <a:spcPts val="0"/>
-                        </a:spcAft>
-                        <a:buClr>
-                          <a:srgbClr val="000000"/>
-                        </a:buClr>
-                        <a:buSzPts val="900"/>
-                        <a:buFont typeface="Arial"/>
-                        <a:buNone/>
-                      </a:pPr>
-                      <a:endParaRPr sz="900" u="none" strike="noStrike" cap="none"/>
-                    </a:p>
-                  </a:txBody>
-                  <a:tcPr marL="68600" marR="68600" marT="34300" marB="34300">
-                    <a:noFill/>
-                  </a:tcPr>
-                </a:tc>
-                <a:extLst>
-                  <a:ext uri="{0D108BD9-81ED-4DB2-BD59-A6C34878D82A}">
-                    <a16:rowId xmlns:a16="http://schemas.microsoft.com/office/drawing/2014/main" val="10017"/>
-                  </a:ext>
-                </a:extLst>
-              </a:tr>
-              <a:tr h="239450">
-                <a:tc>
-                  <a:txBody>
-                    <a:bodyPr/>
-                    <a:lstStyle/>
-                    <a:p>
-                      <a:pPr marL="0" lvl="0" indent="0" algn="l" rtl="0">
-                        <a:spcBef>
-                          <a:spcPts val="0"/>
-                        </a:spcBef>
-                        <a:spcAft>
-                          <a:spcPts val="0"/>
-                        </a:spcAft>
-                        <a:buClr>
-                          <a:schemeClr val="dk1"/>
-                        </a:buClr>
-                        <a:buSzPts val="1100"/>
-                        <a:buFont typeface="Arial"/>
-                        <a:buNone/>
-                      </a:pPr>
-                      <a:r>
-                        <a:rPr lang="de" sz="1100"/>
-                        <a:t>Location/Action</a:t>
-                      </a:r>
-                      <a:endParaRPr sz="1100" u="none" strike="noStrike" cap="none"/>
-                    </a:p>
-                  </a:txBody>
-                  <a:tcPr marL="68600" marR="68600" marT="34300" marB="34300">
-                    <a:noFill/>
-                  </a:tcPr>
-                </a:tc>
-                <a:tc>
-                  <a:txBody>
-                    <a:bodyPr/>
-                    <a:lstStyle/>
-                    <a:p>
-                      <a:pPr marL="0" marR="0" lvl="0" indent="0" algn="l" rtl="0">
-                        <a:lnSpc>
-                          <a:spcPct val="100000"/>
-                        </a:lnSpc>
-                        <a:spcBef>
-                          <a:spcPts val="0"/>
-                        </a:spcBef>
-                        <a:spcAft>
-                          <a:spcPts val="0"/>
-                        </a:spcAft>
-                        <a:buClr>
-                          <a:srgbClr val="000000"/>
-                        </a:buClr>
-                        <a:buSzPts val="900"/>
-                        <a:buFont typeface="Arial"/>
-                        <a:buNone/>
-                      </a:pPr>
-                      <a:endParaRPr sz="900" u="none" strike="noStrike" cap="none"/>
-                    </a:p>
-                  </a:txBody>
-                  <a:tcPr marL="68600" marR="68600" marT="34300" marB="34300">
-                    <a:noFill/>
-                  </a:tcPr>
-                </a:tc>
-                <a:tc>
-                  <a:txBody>
-                    <a:bodyPr/>
-                    <a:lstStyle/>
-                    <a:p>
-                      <a:pPr marL="0" marR="0" lvl="0" indent="0" algn="l" rtl="0">
-                        <a:lnSpc>
-                          <a:spcPct val="100000"/>
-                        </a:lnSpc>
-                        <a:spcBef>
-                          <a:spcPts val="0"/>
-                        </a:spcBef>
-                        <a:spcAft>
-                          <a:spcPts val="0"/>
-                        </a:spcAft>
-                        <a:buClr>
-                          <a:srgbClr val="000000"/>
-                        </a:buClr>
-                        <a:buSzPts val="900"/>
-                        <a:buFont typeface="Arial"/>
-                        <a:buNone/>
-                      </a:pPr>
-                      <a:endParaRPr sz="900" u="none" strike="noStrike" cap="none"/>
-                    </a:p>
-                  </a:txBody>
-                  <a:tcPr marL="68600" marR="68600" marT="34300" marB="34300">
-                    <a:noFill/>
-                  </a:tcPr>
-                </a:tc>
-                <a:extLst>
-                  <a:ext uri="{0D108BD9-81ED-4DB2-BD59-A6C34878D82A}">
-                    <a16:rowId xmlns:a16="http://schemas.microsoft.com/office/drawing/2014/main" val="10018"/>
-                  </a:ext>
-                </a:extLst>
-              </a:tr>
-              <a:tr h="239450">
-                <a:tc>
-                  <a:txBody>
-                    <a:bodyPr/>
-                    <a:lstStyle/>
-                    <a:p>
-                      <a:pPr marL="0" lvl="0" indent="0" algn="l" rtl="0">
-                        <a:spcBef>
-                          <a:spcPts val="0"/>
-                        </a:spcBef>
-                        <a:spcAft>
-                          <a:spcPts val="0"/>
-                        </a:spcAft>
-                        <a:buClr>
-                          <a:schemeClr val="dk1"/>
-                        </a:buClr>
-                        <a:buSzPts val="1100"/>
-                        <a:buFont typeface="Arial"/>
-                        <a:buNone/>
-                      </a:pPr>
-                      <a:r>
-                        <a:rPr lang="de" sz="1100"/>
-                        <a:t>Location/Action</a:t>
-                      </a:r>
-                      <a:endParaRPr sz="1100" u="none" strike="noStrike" cap="none"/>
-                    </a:p>
-                  </a:txBody>
-                  <a:tcPr marL="68600" marR="68600" marT="34300" marB="34300">
-                    <a:noFill/>
-                  </a:tcPr>
-                </a:tc>
-                <a:tc>
-                  <a:txBody>
-                    <a:bodyPr/>
-                    <a:lstStyle/>
-                    <a:p>
-                      <a:pPr marL="0" marR="0" lvl="0" indent="0" algn="l" rtl="0">
-                        <a:lnSpc>
-                          <a:spcPct val="100000"/>
-                        </a:lnSpc>
-                        <a:spcBef>
-                          <a:spcPts val="0"/>
-                        </a:spcBef>
-                        <a:spcAft>
-                          <a:spcPts val="0"/>
-                        </a:spcAft>
-                        <a:buClr>
-                          <a:srgbClr val="000000"/>
-                        </a:buClr>
-                        <a:buSzPts val="900"/>
-                        <a:buFont typeface="Arial"/>
-                        <a:buNone/>
-                      </a:pPr>
-                      <a:endParaRPr sz="900" u="none" strike="noStrike" cap="none" dirty="0"/>
-                    </a:p>
-                  </a:txBody>
-                  <a:tcPr marL="68600" marR="68600" marT="34300" marB="34300">
-                    <a:noFill/>
-                  </a:tcPr>
-                </a:tc>
-                <a:tc>
-                  <a:txBody>
-                    <a:bodyPr/>
-                    <a:lstStyle/>
-                    <a:p>
-                      <a:pPr marL="0" marR="0" lvl="0" indent="0" algn="l" rtl="0">
-                        <a:lnSpc>
-                          <a:spcPct val="100000"/>
-                        </a:lnSpc>
-                        <a:spcBef>
-                          <a:spcPts val="0"/>
-                        </a:spcBef>
-                        <a:spcAft>
-                          <a:spcPts val="0"/>
-                        </a:spcAft>
-                        <a:buClr>
-                          <a:srgbClr val="000000"/>
-                        </a:buClr>
-                        <a:buSzPts val="900"/>
-                        <a:buFont typeface="Arial"/>
-                        <a:buNone/>
-                      </a:pPr>
-                      <a:endParaRPr sz="900" u="none" strike="noStrike" cap="none"/>
-                    </a:p>
-                  </a:txBody>
-                  <a:tcPr marL="68600" marR="68600" marT="34300" marB="34300">
-                    <a:noFill/>
-                  </a:tcPr>
-                </a:tc>
-                <a:extLst>
-                  <a:ext uri="{0D108BD9-81ED-4DB2-BD59-A6C34878D82A}">
-                    <a16:rowId xmlns:a16="http://schemas.microsoft.com/office/drawing/2014/main" val="10019"/>
-                  </a:ext>
-                </a:extLst>
-              </a:tr>
-              <a:tr h="239450">
-                <a:tc>
-                  <a:txBody>
-                    <a:bodyPr/>
-                    <a:lstStyle/>
-                    <a:p>
-                      <a:pPr marL="0" lvl="0" indent="0" algn="l" rtl="0">
-                        <a:spcBef>
-                          <a:spcPts val="0"/>
-                        </a:spcBef>
-                        <a:spcAft>
-                          <a:spcPts val="0"/>
-                        </a:spcAft>
-                        <a:buClr>
-                          <a:schemeClr val="dk1"/>
-                        </a:buClr>
-                        <a:buSzPts val="1100"/>
-                        <a:buFont typeface="Arial"/>
-                        <a:buNone/>
-                      </a:pPr>
-                      <a:r>
-                        <a:rPr lang="de" sz="1100"/>
-                        <a:t>Location/Action</a:t>
-                      </a:r>
-                      <a:endParaRPr sz="1100" u="none" strike="noStrike" cap="none"/>
-                    </a:p>
-                  </a:txBody>
-                  <a:tcPr marL="68600" marR="68600" marT="34300" marB="34300">
-                    <a:noFill/>
-                  </a:tcPr>
-                </a:tc>
-                <a:tc>
-                  <a:txBody>
-                    <a:bodyPr/>
-                    <a:lstStyle/>
-                    <a:p>
-                      <a:pPr marL="0" marR="0" lvl="0" indent="0" algn="l" rtl="0">
-                        <a:lnSpc>
-                          <a:spcPct val="100000"/>
-                        </a:lnSpc>
-                        <a:spcBef>
-                          <a:spcPts val="0"/>
-                        </a:spcBef>
-                        <a:spcAft>
-                          <a:spcPts val="0"/>
-                        </a:spcAft>
-                        <a:buClr>
-                          <a:srgbClr val="000000"/>
-                        </a:buClr>
-                        <a:buSzPts val="900"/>
-                        <a:buFont typeface="Arial"/>
-                        <a:buNone/>
-                      </a:pPr>
-                      <a:endParaRPr sz="900" u="none" strike="noStrike" cap="none" dirty="0"/>
-                    </a:p>
-                  </a:txBody>
-                  <a:tcPr marL="68600" marR="68600" marT="34300" marB="34300">
-                    <a:noFill/>
-                  </a:tcPr>
-                </a:tc>
-                <a:tc>
-                  <a:txBody>
-                    <a:bodyPr/>
-                    <a:lstStyle/>
-                    <a:p>
-                      <a:pPr marL="0" marR="0" lvl="0" indent="0" algn="l" rtl="0">
-                        <a:lnSpc>
-                          <a:spcPct val="100000"/>
-                        </a:lnSpc>
-                        <a:spcBef>
-                          <a:spcPts val="0"/>
-                        </a:spcBef>
-                        <a:spcAft>
-                          <a:spcPts val="0"/>
-                        </a:spcAft>
-                        <a:buClr>
-                          <a:srgbClr val="000000"/>
-                        </a:buClr>
-                        <a:buSzPts val="900"/>
-                        <a:buFont typeface="Arial"/>
-                        <a:buNone/>
-                      </a:pPr>
-                      <a:endParaRPr sz="900" u="none" strike="noStrike" cap="none" dirty="0"/>
-                    </a:p>
-                  </a:txBody>
-                  <a:tcPr marL="68600" marR="68600" marT="34300" marB="34300">
-                    <a:noFill/>
-                  </a:tcPr>
-                </a:tc>
-                <a:extLst>
-                  <a:ext uri="{0D108BD9-81ED-4DB2-BD59-A6C34878D82A}">
-                    <a16:rowId xmlns:a16="http://schemas.microsoft.com/office/drawing/2014/main" val="10020"/>
-                  </a:ext>
-                </a:extLst>
-              </a:tr>
-            </a:tbl>
-          </a:graphicData>
-        </a:graphic>
-      </p:graphicFrame>
-    </p:spTree>
-  </p:cSld>
-  <p:clrMapOvr>
-    <a:masterClrMapping/>
-  </p:clrMapOvr>
-</p:sld>
-</file>
-
-<file path=ppt/slides/slide6.xml><?xml version="1.0" encoding="utf-8"?>
 <p:sld xmlns:a="http://schemas.openxmlformats.org/drawingml/2006/main" xmlns:r="http://schemas.openxmlformats.org/officeDocument/2006/relationships" xmlns:p="http://schemas.openxmlformats.org/presentationml/2006/main">
   <p:cSld>
     <p:spTree>
@@ -29311,7 +26868,7 @@
           <p:nvPr>
             <p:extLst>
               <p:ext uri="{D42A27DB-BD31-4B8C-83A1-F6EECF244321}">
-                <p14:modId xmlns:p14="http://schemas.microsoft.com/office/powerpoint/2010/main" val="883560380"/>
+                <p14:modId xmlns:p14="http://schemas.microsoft.com/office/powerpoint/2010/main" val="1756318248"/>
               </p:ext>
             </p:extLst>
           </p:nvPr>
@@ -29520,7 +27077,7 @@
                       </a:pPr>
                       <a:r>
                         <a:rPr lang="de" sz="1100" dirty="0"/>
-                        <a:t>Location/Action</a:t>
+                        <a:t>Selection</a:t>
                       </a:r>
                       <a:endParaRPr sz="1100" u="none" strike="noStrike" cap="none" dirty="0"/>
                     </a:p>
@@ -29551,6 +27108,10 @@
                         <a:buFont typeface="Arial"/>
                         <a:buNone/>
                       </a:pPr>
+                      <a:r>
+                        <a:rPr lang="de-DE" sz="1100" u="none" strike="noStrike" cap="none" dirty="0"/>
+                        <a:t>… … Ah Es ist mein Kunde… muss ich wirklich?</a:t>
+                      </a:r>
                       <a:endParaRPr sz="1100" u="none" strike="noStrike" cap="none" dirty="0"/>
                     </a:p>
                   </a:txBody>
@@ -29580,7 +27141,11 @@
                         <a:buFont typeface="Arial"/>
                         <a:buNone/>
                       </a:pPr>
-                      <a:endParaRPr sz="1100" u="none" strike="noStrike" cap="none"/>
+                      <a:r>
+                        <a:rPr lang="de-DE" sz="1100" u="none" strike="noStrike" cap="none" dirty="0"/>
+                        <a:t>-</a:t>
+                      </a:r>
+                      <a:endParaRPr sz="1100" u="none" strike="noStrike" cap="none" dirty="0"/>
                     </a:p>
                   </a:txBody>
                   <a:tcPr marL="68600" marR="68600" marT="34300" marB="34300">
@@ -29614,10 +27179,10 @@
                         <a:buNone/>
                       </a:pPr>
                       <a:r>
-                        <a:rPr lang="de" sz="1100"/>
-                        <a:t>Location/Action</a:t>
+                        <a:rPr lang="de" sz="1100" dirty="0"/>
+                        <a:t>After Care</a:t>
                       </a:r>
-                      <a:endParaRPr sz="1100" u="none" strike="noStrike" cap="none"/>
+                      <a:endParaRPr sz="1100" u="none" strike="noStrike" cap="none" dirty="0"/>
                     </a:p>
                   </a:txBody>
                   <a:tcPr marL="68600" marR="68600" marT="34300" marB="34300">
@@ -29646,7 +27211,11 @@
                         <a:buFont typeface="Arial"/>
                         <a:buNone/>
                       </a:pPr>
-                      <a:endParaRPr sz="1100" u="none" strike="noStrike" cap="none"/>
+                      <a:r>
+                        <a:rPr lang="de-DE" sz="1100" u="none" strike="noStrike" cap="none" dirty="0"/>
+                        <a:t>Ok das war gar nicht so schlimm wie gedacht…</a:t>
+                      </a:r>
+                      <a:endParaRPr sz="1100" u="none" strike="noStrike" cap="none" dirty="0"/>
                     </a:p>
                   </a:txBody>
                   <a:tcPr marL="68600" marR="68600" marT="34300" marB="34300">
@@ -29675,7 +27244,11 @@
                         <a:buFont typeface="Arial"/>
                         <a:buNone/>
                       </a:pPr>
-                      <a:endParaRPr sz="1100" u="none" strike="noStrike" cap="none"/>
+                      <a:r>
+                        <a:rPr lang="de-DE" sz="1100" u="none" strike="noStrike" cap="none" dirty="0"/>
+                        <a:t>-</a:t>
+                      </a:r>
+                      <a:endParaRPr sz="1100" u="none" strike="noStrike" cap="none" dirty="0"/>
                     </a:p>
                   </a:txBody>
                   <a:tcPr marL="68600" marR="68600" marT="34300" marB="34300">
@@ -29709,8 +27282,49 @@
                         <a:buNone/>
                       </a:pPr>
                       <a:r>
-                        <a:rPr lang="de" sz="1100"/>
-                        <a:t>Location/Action</a:t>
+                        <a:rPr lang="de" sz="1100" dirty="0"/>
+                        <a:t>Not Selected</a:t>
+                      </a:r>
+                      <a:endParaRPr sz="1100" u="none" strike="noStrike" cap="none" dirty="0"/>
+                    </a:p>
+                  </a:txBody>
+                  <a:tcPr marL="68600" marR="68600" marT="34300" marB="34300">
+                    <a:noFill/>
+                  </a:tcPr>
+                </a:tc>
+                <a:tc>
+                  <a:txBody>
+                    <a:bodyPr/>
+                    <a:lstStyle/>
+                    <a:p>
+                      <a:pPr marL="0" marR="0" lvl="0" indent="0" algn="l" rtl="0">
+                        <a:lnSpc>
+                          <a:spcPct val="100000"/>
+                        </a:lnSpc>
+                        <a:spcBef>
+                          <a:spcPts val="0"/>
+                        </a:spcBef>
+                        <a:spcAft>
+                          <a:spcPts val="0"/>
+                        </a:spcAft>
+                        <a:buClr>
+                          <a:srgbClr val="000000"/>
+                        </a:buClr>
+                        <a:buSzPts val="1100"/>
+                        <a:buFont typeface="Arial"/>
+                        <a:buNone/>
+                      </a:pPr>
+                      <a:r>
+                        <a:rPr lang="de-DE" sz="1100" u="none" strike="noStrike" cap="none" dirty="0" err="1"/>
+                        <a:t>Ahh</a:t>
+                      </a:r>
+                      <a:r>
+                        <a:rPr lang="de-DE" sz="1100" u="none" strike="noStrike" cap="none" dirty="0"/>
+                        <a:t> danke</a:t>
+                      </a:r>
+                      <a:r>
+                        <a:rPr lang="de-DE" sz="1100" u="none" strike="noStrike" cap="none"/>
+                        <a:t>… danke…</a:t>
                       </a:r>
                       <a:endParaRPr sz="1100" u="none" strike="noStrike" cap="none"/>
                     </a:p>
@@ -29741,36 +27355,11 @@
                         <a:buFont typeface="Arial"/>
                         <a:buNone/>
                       </a:pPr>
-                      <a:endParaRPr sz="1100" u="none" strike="noStrike" cap="none"/>
-                    </a:p>
-                  </a:txBody>
-                  <a:tcPr marL="68600" marR="68600" marT="34300" marB="34300">
-                    <a:noFill/>
-                  </a:tcPr>
-                </a:tc>
-                <a:tc>
-                  <a:txBody>
-                    <a:bodyPr/>
-                    <a:lstStyle/>
-                    <a:p>
-                      <a:pPr marL="0" marR="0" lvl="0" indent="0" algn="l" rtl="0">
-                        <a:lnSpc>
-                          <a:spcPct val="100000"/>
-                        </a:lnSpc>
-                        <a:spcBef>
-                          <a:spcPts val="0"/>
-                        </a:spcBef>
-                        <a:spcAft>
-                          <a:spcPts val="0"/>
-                        </a:spcAft>
-                        <a:buClr>
-                          <a:srgbClr val="000000"/>
-                        </a:buClr>
-                        <a:buSzPts val="1100"/>
-                        <a:buFont typeface="Arial"/>
-                        <a:buNone/>
-                      </a:pPr>
-                      <a:endParaRPr sz="1100" u="none" strike="noStrike" cap="none"/>
+                      <a:r>
+                        <a:rPr lang="de-DE" sz="1100" u="none" strike="noStrike" cap="none" dirty="0"/>
+                        <a:t>-</a:t>
+                      </a:r>
+                      <a:endParaRPr sz="1100" u="none" strike="noStrike" cap="none" dirty="0"/>
                     </a:p>
                   </a:txBody>
                   <a:tcPr marL="68600" marR="68600" marT="34300" marB="34300">
@@ -29836,7 +27425,11 @@
                         <a:buFont typeface="Arial"/>
                         <a:buNone/>
                       </a:pPr>
-                      <a:endParaRPr sz="1100" u="none" strike="noStrike" cap="none"/>
+                      <a:r>
+                        <a:rPr lang="de-DE" sz="1100" u="none" strike="noStrike" cap="none" dirty="0"/>
+                        <a:t>-</a:t>
+                      </a:r>
+                      <a:endParaRPr sz="1100" u="none" strike="noStrike" cap="none" dirty="0"/>
                     </a:p>
                   </a:txBody>
                   <a:tcPr marL="68600" marR="68600" marT="34300" marB="34300">
@@ -29865,7 +27458,11 @@
                         <a:buFont typeface="Arial"/>
                         <a:buNone/>
                       </a:pPr>
-                      <a:endParaRPr sz="1100" u="none" strike="noStrike" cap="none"/>
+                      <a:r>
+                        <a:rPr lang="de-DE" sz="1100" u="none" strike="noStrike" cap="none" dirty="0"/>
+                        <a:t>-</a:t>
+                      </a:r>
+                      <a:endParaRPr sz="1100" u="none" strike="noStrike" cap="none" dirty="0"/>
                     </a:p>
                   </a:txBody>
                   <a:tcPr marL="68600" marR="68600" marT="34300" marB="34300">
@@ -29931,7 +27528,11 @@
                         <a:buFont typeface="Arial"/>
                         <a:buNone/>
                       </a:pPr>
-                      <a:endParaRPr sz="1100" u="none" strike="noStrike" cap="none"/>
+                      <a:r>
+                        <a:rPr lang="de-DE" sz="1100" u="none" strike="noStrike" cap="none" dirty="0"/>
+                        <a:t>-</a:t>
+                      </a:r>
+                      <a:endParaRPr sz="1100" u="none" strike="noStrike" cap="none" dirty="0"/>
                     </a:p>
                   </a:txBody>
                   <a:tcPr marL="68600" marR="68600" marT="34300" marB="34300">
@@ -29960,7 +27561,11 @@
                         <a:buFont typeface="Arial"/>
                         <a:buNone/>
                       </a:pPr>
-                      <a:endParaRPr sz="1100" u="none" strike="noStrike" cap="none"/>
+                      <a:r>
+                        <a:rPr lang="de-DE" sz="1100" u="none" strike="noStrike" cap="none" dirty="0"/>
+                        <a:t>-</a:t>
+                      </a:r>
+                      <a:endParaRPr sz="1100" u="none" strike="noStrike" cap="none" dirty="0"/>
                     </a:p>
                   </a:txBody>
                   <a:tcPr marL="68600" marR="68600" marT="34300" marB="34300">
@@ -30026,7 +27631,11 @@
                         <a:buFont typeface="Arial"/>
                         <a:buNone/>
                       </a:pPr>
-                      <a:endParaRPr sz="1100" u="none" strike="noStrike" cap="none"/>
+                      <a:r>
+                        <a:rPr lang="de-DE" sz="1100" u="none" strike="noStrike" cap="none" dirty="0"/>
+                        <a:t>-</a:t>
+                      </a:r>
+                      <a:endParaRPr sz="1100" u="none" strike="noStrike" cap="none" dirty="0"/>
                     </a:p>
                   </a:txBody>
                   <a:tcPr marL="68600" marR="68600" marT="34300" marB="34300">
@@ -30055,7 +27664,11 @@
                         <a:buFont typeface="Arial"/>
                         <a:buNone/>
                       </a:pPr>
-                      <a:endParaRPr sz="1100" u="none" strike="noStrike" cap="none"/>
+                      <a:r>
+                        <a:rPr lang="de-DE" sz="1100" u="none" strike="noStrike" cap="none" dirty="0"/>
+                        <a:t>-</a:t>
+                      </a:r>
+                      <a:endParaRPr sz="1100" u="none" strike="noStrike" cap="none" dirty="0"/>
                     </a:p>
                   </a:txBody>
                   <a:tcPr marL="68600" marR="68600" marT="34300" marB="34300">
@@ -30170,7 +27783,7 @@
                         <a:buNone/>
                       </a:pPr>
                       <a:r>
-                        <a:rPr lang="de" sz="1100" b="1" u="none" strike="noStrike" cap="none">
+                        <a:rPr lang="de" sz="1100" b="1" u="none" strike="noStrike" cap="none" dirty="0">
                           <a:solidFill>
                             <a:schemeClr val="dk1"/>
                           </a:solidFill>
@@ -30178,18 +27791,18 @@
                         <a:t>DIALOGUE BARK – </a:t>
                       </a:r>
                       <a:r>
-                        <a:rPr lang="de" sz="1100" b="1"/>
+                        <a:rPr lang="de" sz="1100" b="1" dirty="0"/>
                         <a:t>Situation </a:t>
                       </a:r>
                       <a:r>
-                        <a:rPr lang="de" sz="1100" b="1" u="none" strike="noStrike" cap="none">
+                        <a:rPr lang="de" sz="1100" b="1" u="none" strike="noStrike" cap="none" dirty="0">
                           <a:solidFill>
                             <a:schemeClr val="dk1"/>
                           </a:solidFill>
                         </a:rPr>
                         <a:t> v02</a:t>
                       </a:r>
-                      <a:endParaRPr sz="1100" u="none" strike="noStrike" cap="none"/>
+                      <a:endParaRPr sz="1100" u="none" strike="noStrike" cap="none" dirty="0"/>
                     </a:p>
                   </a:txBody>
                   <a:tcPr marL="68600" marR="68600" marT="34300" marB="34300">
@@ -30257,6 +27870,10 @@
                         <a:buFont typeface="Arial"/>
                         <a:buNone/>
                       </a:pPr>
+                      <a:r>
+                        <a:rPr lang="de-DE" sz="1100" u="none" strike="noStrike" cap="none" dirty="0"/>
+                        <a:t>-</a:t>
+                      </a:r>
                       <a:endParaRPr sz="1100" u="none" strike="noStrike" cap="none" dirty="0"/>
                     </a:p>
                   </a:txBody>
@@ -30286,7 +27903,11 @@
                         <a:buFont typeface="Arial"/>
                         <a:buNone/>
                       </a:pPr>
-                      <a:endParaRPr sz="1100" u="none" strike="noStrike" cap="none"/>
+                      <a:r>
+                        <a:rPr lang="de-DE" sz="1100" u="none" strike="noStrike" cap="none" dirty="0"/>
+                        <a:t>-</a:t>
+                      </a:r>
+                      <a:endParaRPr sz="1100" u="none" strike="noStrike" cap="none" dirty="0"/>
                     </a:p>
                   </a:txBody>
                   <a:tcPr marL="68600" marR="68600" marT="34300" marB="34300">
@@ -30352,6 +27973,10 @@
                         <a:buFont typeface="Arial"/>
                         <a:buNone/>
                       </a:pPr>
+                      <a:r>
+                        <a:rPr lang="de-DE" sz="1100" u="none" strike="noStrike" cap="none" dirty="0"/>
+                        <a:t>-</a:t>
+                      </a:r>
                       <a:endParaRPr sz="1100" u="none" strike="noStrike" cap="none" dirty="0"/>
                     </a:p>
                   </a:txBody>
@@ -30381,7 +28006,11 @@
                         <a:buFont typeface="Arial"/>
                         <a:buNone/>
                       </a:pPr>
-                      <a:endParaRPr sz="1100" u="none" strike="noStrike" cap="none"/>
+                      <a:r>
+                        <a:rPr lang="de-DE" sz="1100" u="none" strike="noStrike" cap="none" dirty="0"/>
+                        <a:t>-</a:t>
+                      </a:r>
+                      <a:endParaRPr sz="1100" u="none" strike="noStrike" cap="none" dirty="0"/>
                     </a:p>
                   </a:txBody>
                   <a:tcPr marL="68600" marR="68600" marT="34300" marB="34300">
@@ -30415,38 +28044,9 @@
                         <a:buNone/>
                       </a:pPr>
                       <a:r>
-                        <a:rPr lang="de" sz="1100"/>
+                        <a:rPr lang="de" sz="1100" dirty="0"/>
                         <a:t>Location/Action</a:t>
                       </a:r>
-                      <a:endParaRPr sz="1100" u="none" strike="noStrike" cap="none"/>
-                    </a:p>
-                  </a:txBody>
-                  <a:tcPr marL="68600" marR="68600" marT="34300" marB="34300">
-                    <a:noFill/>
-                  </a:tcPr>
-                </a:tc>
-                <a:tc>
-                  <a:txBody>
-                    <a:bodyPr/>
-                    <a:lstStyle/>
-                    <a:p>
-                      <a:pPr marL="0" marR="0" lvl="0" indent="0" algn="l" rtl="0">
-                        <a:lnSpc>
-                          <a:spcPct val="100000"/>
-                        </a:lnSpc>
-                        <a:spcBef>
-                          <a:spcPts val="0"/>
-                        </a:spcBef>
-                        <a:spcAft>
-                          <a:spcPts val="0"/>
-                        </a:spcAft>
-                        <a:buClr>
-                          <a:srgbClr val="000000"/>
-                        </a:buClr>
-                        <a:buSzPts val="1100"/>
-                        <a:buFont typeface="Arial"/>
-                        <a:buNone/>
-                      </a:pPr>
                       <a:endParaRPr sz="1100" u="none" strike="noStrike" cap="none" dirty="0"/>
                     </a:p>
                   </a:txBody>
@@ -30476,7 +28076,44 @@
                         <a:buFont typeface="Arial"/>
                         <a:buNone/>
                       </a:pPr>
-                      <a:endParaRPr sz="1100" u="none" strike="noStrike" cap="none"/>
+                      <a:r>
+                        <a:rPr lang="de-DE" sz="1100" u="none" strike="noStrike" cap="none" dirty="0"/>
+                        <a:t>-</a:t>
+                      </a:r>
+                      <a:endParaRPr sz="1100" u="none" strike="noStrike" cap="none" dirty="0"/>
+                    </a:p>
+                  </a:txBody>
+                  <a:tcPr marL="68600" marR="68600" marT="34300" marB="34300">
+                    <a:noFill/>
+                  </a:tcPr>
+                </a:tc>
+                <a:tc>
+                  <a:txBody>
+                    <a:bodyPr/>
+                    <a:lstStyle/>
+                    <a:p>
+                      <a:pPr marL="0" marR="0" lvl="0" indent="0" algn="l" rtl="0">
+                        <a:lnSpc>
+                          <a:spcPct val="100000"/>
+                        </a:lnSpc>
+                        <a:spcBef>
+                          <a:spcPts val="0"/>
+                        </a:spcBef>
+                        <a:spcAft>
+                          <a:spcPts val="0"/>
+                        </a:spcAft>
+                        <a:buClr>
+                          <a:srgbClr val="000000"/>
+                        </a:buClr>
+                        <a:buSzPts val="1100"/>
+                        <a:buFont typeface="Arial"/>
+                        <a:buNone/>
+                      </a:pPr>
+                      <a:r>
+                        <a:rPr lang="de-DE" sz="1100" u="none" strike="noStrike" cap="none" dirty="0"/>
+                        <a:t>-</a:t>
+                      </a:r>
+                      <a:endParaRPr sz="1100" u="none" strike="noStrike" cap="none" dirty="0"/>
                     </a:p>
                   </a:txBody>
                   <a:tcPr marL="68600" marR="68600" marT="34300" marB="34300">
@@ -30510,38 +28147,9 @@
                         <a:buNone/>
                       </a:pPr>
                       <a:r>
-                        <a:rPr lang="de" sz="1100"/>
+                        <a:rPr lang="de" sz="1100" dirty="0"/>
                         <a:t>Location/Action</a:t>
                       </a:r>
-                      <a:endParaRPr sz="1100" u="none" strike="noStrike" cap="none"/>
-                    </a:p>
-                  </a:txBody>
-                  <a:tcPr marL="68600" marR="68600" marT="34300" marB="34300">
-                    <a:noFill/>
-                  </a:tcPr>
-                </a:tc>
-                <a:tc>
-                  <a:txBody>
-                    <a:bodyPr/>
-                    <a:lstStyle/>
-                    <a:p>
-                      <a:pPr marL="0" marR="0" lvl="0" indent="0" algn="l" rtl="0">
-                        <a:lnSpc>
-                          <a:spcPct val="100000"/>
-                        </a:lnSpc>
-                        <a:spcBef>
-                          <a:spcPts val="0"/>
-                        </a:spcBef>
-                        <a:spcAft>
-                          <a:spcPts val="0"/>
-                        </a:spcAft>
-                        <a:buClr>
-                          <a:srgbClr val="000000"/>
-                        </a:buClr>
-                        <a:buSzPts val="1100"/>
-                        <a:buFont typeface="Arial"/>
-                        <a:buNone/>
-                      </a:pPr>
                       <a:endParaRPr sz="1100" u="none" strike="noStrike" cap="none" dirty="0"/>
                     </a:p>
                   </a:txBody>
@@ -30571,7 +28179,44 @@
                         <a:buFont typeface="Arial"/>
                         <a:buNone/>
                       </a:pPr>
-                      <a:endParaRPr sz="1100" u="none" strike="noStrike" cap="none"/>
+                      <a:r>
+                        <a:rPr lang="de-DE" sz="1100" u="none" strike="noStrike" cap="none" dirty="0"/>
+                        <a:t>-</a:t>
+                      </a:r>
+                      <a:endParaRPr sz="1100" u="none" strike="noStrike" cap="none" dirty="0"/>
+                    </a:p>
+                  </a:txBody>
+                  <a:tcPr marL="68600" marR="68600" marT="34300" marB="34300">
+                    <a:noFill/>
+                  </a:tcPr>
+                </a:tc>
+                <a:tc>
+                  <a:txBody>
+                    <a:bodyPr/>
+                    <a:lstStyle/>
+                    <a:p>
+                      <a:pPr marL="0" marR="0" lvl="0" indent="0" algn="l" rtl="0">
+                        <a:lnSpc>
+                          <a:spcPct val="100000"/>
+                        </a:lnSpc>
+                        <a:spcBef>
+                          <a:spcPts val="0"/>
+                        </a:spcBef>
+                        <a:spcAft>
+                          <a:spcPts val="0"/>
+                        </a:spcAft>
+                        <a:buClr>
+                          <a:srgbClr val="000000"/>
+                        </a:buClr>
+                        <a:buSzPts val="1100"/>
+                        <a:buFont typeface="Arial"/>
+                        <a:buNone/>
+                      </a:pPr>
+                      <a:r>
+                        <a:rPr lang="de-DE" sz="1100" u="none" strike="noStrike" cap="none" dirty="0"/>
+                        <a:t>-</a:t>
+                      </a:r>
+                      <a:endParaRPr sz="1100" u="none" strike="noStrike" cap="none" dirty="0"/>
                     </a:p>
                   </a:txBody>
                   <a:tcPr marL="68600" marR="68600" marT="34300" marB="34300">
@@ -30605,10 +28250,10 @@
                         <a:buNone/>
                       </a:pPr>
                       <a:r>
-                        <a:rPr lang="de" sz="1100"/>
+                        <a:rPr lang="de" sz="1100" dirty="0"/>
                         <a:t>Location/Action</a:t>
                       </a:r>
-                      <a:endParaRPr sz="1100" u="none" strike="noStrike" cap="none"/>
+                      <a:endParaRPr sz="1100" u="none" strike="noStrike" cap="none" dirty="0"/>
                     </a:p>
                   </a:txBody>
                   <a:tcPr marL="68600" marR="68600" marT="34300" marB="34300">
@@ -30637,6 +28282,10 @@
                         <a:buFont typeface="Arial"/>
                         <a:buNone/>
                       </a:pPr>
+                      <a:r>
+                        <a:rPr lang="de-DE" sz="900" u="none" strike="noStrike" cap="none" dirty="0"/>
+                        <a:t>-</a:t>
+                      </a:r>
                       <a:endParaRPr sz="900" u="none" strike="noStrike" cap="none" dirty="0"/>
                     </a:p>
                   </a:txBody>
@@ -30666,7 +28315,11 @@
                         <a:buFont typeface="Arial"/>
                         <a:buNone/>
                       </a:pPr>
-                      <a:endParaRPr sz="900" u="none" strike="noStrike" cap="none"/>
+                      <a:r>
+                        <a:rPr lang="de-DE" sz="900" u="none" strike="noStrike" cap="none" dirty="0"/>
+                        <a:t>-</a:t>
+                      </a:r>
+                      <a:endParaRPr sz="900" u="none" strike="noStrike" cap="none" dirty="0"/>
                     </a:p>
                   </a:txBody>
                   <a:tcPr marL="68600" marR="68600" marT="34300" marB="34300">
@@ -30700,10 +28353,10 @@
                         <a:buNone/>
                       </a:pPr>
                       <a:r>
-                        <a:rPr lang="de" sz="1100"/>
+                        <a:rPr lang="de" sz="1100" dirty="0"/>
                         <a:t>Location/Action</a:t>
                       </a:r>
-                      <a:endParaRPr sz="1100" u="none" strike="noStrike" cap="none"/>
+                      <a:endParaRPr sz="1100" u="none" strike="noStrike" cap="none" dirty="0"/>
                     </a:p>
                   </a:txBody>
                   <a:tcPr marL="68600" marR="68600" marT="34300" marB="34300">
@@ -30732,7 +28385,11 @@
                         <a:buFont typeface="Arial"/>
                         <a:buNone/>
                       </a:pPr>
-                      <a:endParaRPr sz="900" u="none" strike="noStrike" cap="none"/>
+                      <a:r>
+                        <a:rPr lang="de-DE" sz="900" u="none" strike="noStrike" cap="none" dirty="0"/>
+                        <a:t>-</a:t>
+                      </a:r>
+                      <a:endParaRPr sz="900" u="none" strike="noStrike" cap="none" dirty="0"/>
                     </a:p>
                   </a:txBody>
                   <a:tcPr marL="68600" marR="68600" marT="34300" marB="34300">
@@ -30761,7 +28418,11 @@
                         <a:buFont typeface="Arial"/>
                         <a:buNone/>
                       </a:pPr>
-                      <a:endParaRPr sz="900" u="none" strike="noStrike" cap="none"/>
+                      <a:r>
+                        <a:rPr lang="de-DE" sz="900" u="none" strike="noStrike" cap="none" dirty="0"/>
+                        <a:t>-</a:t>
+                      </a:r>
+                      <a:endParaRPr sz="900" u="none" strike="noStrike" cap="none" dirty="0"/>
                     </a:p>
                   </a:txBody>
                   <a:tcPr marL="68600" marR="68600" marT="34300" marB="34300">
@@ -30798,14 +28459,14 @@
                         <a:buNone/>
                       </a:pPr>
                       <a:r>
-                        <a:rPr lang="de" sz="1100" b="1" u="none" strike="noStrike" cap="none">
+                        <a:rPr lang="de" sz="1100" b="1" u="none" strike="noStrike" cap="none" dirty="0">
                           <a:solidFill>
                             <a:schemeClr val="dk1"/>
                           </a:solidFill>
                         </a:rPr>
                         <a:t>Character: (Name)</a:t>
                       </a:r>
-                      <a:endParaRPr sz="1100" u="none" strike="noStrike" cap="none"/>
+                      <a:endParaRPr sz="1100" u="none" strike="noStrike" cap="none" dirty="0"/>
                     </a:p>
                   </a:txBody>
                   <a:tcPr marL="68600" marR="68600" marT="34300" marB="34300">
@@ -30880,7 +28541,7 @@
                         <a:buNone/>
                       </a:pPr>
                       <a:r>
-                        <a:rPr lang="de" sz="1100" b="1" u="none" strike="noStrike" cap="none">
+                        <a:rPr lang="de" sz="1100" b="1" u="none" strike="noStrike" cap="none" dirty="0">
                           <a:solidFill>
                             <a:schemeClr val="dk1"/>
                           </a:solidFill>
@@ -30888,18 +28549,18 @@
                         <a:t>DIALOGUE BARK –  </a:t>
                       </a:r>
                       <a:r>
-                        <a:rPr lang="de" sz="1100" b="1"/>
+                        <a:rPr lang="de" sz="1100" b="1" dirty="0"/>
                         <a:t>Situation </a:t>
                       </a:r>
                       <a:r>
-                        <a:rPr lang="de" sz="1100" b="1" u="none" strike="noStrike" cap="none">
+                        <a:rPr lang="de" sz="1100" b="1" u="none" strike="noStrike" cap="none" dirty="0">
                           <a:solidFill>
                             <a:schemeClr val="dk1"/>
                           </a:solidFill>
                         </a:rPr>
                         <a:t>v02</a:t>
                       </a:r>
-                      <a:endParaRPr sz="1100" u="none" strike="noStrike" cap="none"/>
+                      <a:endParaRPr sz="1100" u="none" strike="noStrike" cap="none" dirty="0"/>
                     </a:p>
                   </a:txBody>
                   <a:tcPr marL="68600" marR="68600" marT="34300" marB="34300">
@@ -30967,7 +28628,11 @@
                         <a:buFont typeface="Arial"/>
                         <a:buNone/>
                       </a:pPr>
-                      <a:endParaRPr sz="900" u="none" strike="noStrike" cap="none"/>
+                      <a:r>
+                        <a:rPr lang="de-DE" sz="900" u="none" strike="noStrike" cap="none" dirty="0"/>
+                        <a:t>-</a:t>
+                      </a:r>
+                      <a:endParaRPr sz="900" u="none" strike="noStrike" cap="none" dirty="0"/>
                     </a:p>
                   </a:txBody>
                   <a:tcPr marL="68600" marR="68600" marT="34300" marB="34300">
@@ -30996,7 +28661,11 @@
                         <a:buFont typeface="Arial"/>
                         <a:buNone/>
                       </a:pPr>
-                      <a:endParaRPr sz="900" u="none" strike="noStrike" cap="none"/>
+                      <a:r>
+                        <a:rPr lang="de-DE" sz="900" u="none" strike="noStrike" cap="none" dirty="0"/>
+                        <a:t>-</a:t>
+                      </a:r>
+                      <a:endParaRPr sz="900" u="none" strike="noStrike" cap="none" dirty="0"/>
                     </a:p>
                   </a:txBody>
                   <a:tcPr marL="68600" marR="68600" marT="34300" marB="34300">
@@ -31030,10 +28699,10 @@
                         <a:buNone/>
                       </a:pPr>
                       <a:r>
-                        <a:rPr lang="de" sz="1100"/>
+                        <a:rPr lang="de" sz="1100" dirty="0"/>
                         <a:t>Location/Action</a:t>
                       </a:r>
-                      <a:endParaRPr sz="1100" u="none" strike="noStrike" cap="none"/>
+                      <a:endParaRPr sz="1100" u="none" strike="noStrike" cap="none" dirty="0"/>
                     </a:p>
                   </a:txBody>
                   <a:tcPr marL="68600" marR="68600" marT="34300" marB="34300">
@@ -31062,7 +28731,11 @@
                         <a:buFont typeface="Arial"/>
                         <a:buNone/>
                       </a:pPr>
-                      <a:endParaRPr sz="900" u="none" strike="noStrike" cap="none"/>
+                      <a:r>
+                        <a:rPr lang="de-DE" sz="900" u="none" strike="noStrike" cap="none" dirty="0"/>
+                        <a:t>-</a:t>
+                      </a:r>
+                      <a:endParaRPr sz="900" u="none" strike="noStrike" cap="none" dirty="0"/>
                     </a:p>
                   </a:txBody>
                   <a:tcPr marL="68600" marR="68600" marT="34300" marB="34300">
@@ -31091,7 +28764,11 @@
                         <a:buFont typeface="Arial"/>
                         <a:buNone/>
                       </a:pPr>
-                      <a:endParaRPr sz="900" u="none" strike="noStrike" cap="none"/>
+                      <a:r>
+                        <a:rPr lang="de-DE" sz="900" u="none" strike="noStrike" cap="none" dirty="0"/>
+                        <a:t>-</a:t>
+                      </a:r>
+                      <a:endParaRPr sz="900" u="none" strike="noStrike" cap="none" dirty="0"/>
                     </a:p>
                   </a:txBody>
                   <a:tcPr marL="68600" marR="68600" marT="34300" marB="34300">
@@ -31125,10 +28802,10 @@
                         <a:buNone/>
                       </a:pPr>
                       <a:r>
-                        <a:rPr lang="de" sz="1100"/>
+                        <a:rPr lang="de" sz="1100" dirty="0"/>
                         <a:t>Location/Action</a:t>
                       </a:r>
-                      <a:endParaRPr sz="1100" u="none" strike="noStrike" cap="none"/>
+                      <a:endParaRPr sz="1100" u="none" strike="noStrike" cap="none" dirty="0"/>
                     </a:p>
                   </a:txBody>
                   <a:tcPr marL="68600" marR="68600" marT="34300" marB="34300">
@@ -31157,7 +28834,11 @@
                         <a:buFont typeface="Arial"/>
                         <a:buNone/>
                       </a:pPr>
-                      <a:endParaRPr sz="900" u="none" strike="noStrike" cap="none"/>
+                      <a:r>
+                        <a:rPr lang="de-DE" sz="900" u="none" strike="noStrike" cap="none" dirty="0"/>
+                        <a:t>-</a:t>
+                      </a:r>
+                      <a:endParaRPr sz="900" u="none" strike="noStrike" cap="none" dirty="0"/>
                     </a:p>
                   </a:txBody>
                   <a:tcPr marL="68600" marR="68600" marT="34300" marB="34300">
@@ -31186,7 +28867,11 @@
                         <a:buFont typeface="Arial"/>
                         <a:buNone/>
                       </a:pPr>
-                      <a:endParaRPr sz="900" u="none" strike="noStrike" cap="none"/>
+                      <a:r>
+                        <a:rPr lang="de-DE" sz="900" u="none" strike="noStrike" cap="none" dirty="0"/>
+                        <a:t>-</a:t>
+                      </a:r>
+                      <a:endParaRPr sz="900" u="none" strike="noStrike" cap="none" dirty="0"/>
                     </a:p>
                   </a:txBody>
                   <a:tcPr marL="68600" marR="68600" marT="34300" marB="34300">
@@ -31220,10 +28905,10 @@
                         <a:buNone/>
                       </a:pPr>
                       <a:r>
-                        <a:rPr lang="de" sz="1100"/>
+                        <a:rPr lang="de" sz="1100" dirty="0"/>
                         <a:t>Location/Action</a:t>
                       </a:r>
-                      <a:endParaRPr sz="1100" u="none" strike="noStrike" cap="none"/>
+                      <a:endParaRPr sz="1100" u="none" strike="noStrike" cap="none" dirty="0"/>
                     </a:p>
                   </a:txBody>
                   <a:tcPr marL="68600" marR="68600" marT="34300" marB="34300">
@@ -31252,6 +28937,10 @@
                         <a:buFont typeface="Arial"/>
                         <a:buNone/>
                       </a:pPr>
+                      <a:r>
+                        <a:rPr lang="de-DE" sz="900" u="none" strike="noStrike" cap="none" dirty="0"/>
+                        <a:t>-</a:t>
+                      </a:r>
                       <a:endParaRPr sz="900" u="none" strike="noStrike" cap="none" dirty="0"/>
                     </a:p>
                   </a:txBody>
@@ -31281,6 +28970,10 @@
                         <a:buFont typeface="Arial"/>
                         <a:buNone/>
                       </a:pPr>
+                      <a:r>
+                        <a:rPr lang="de-DE" sz="900" u="none" strike="noStrike" cap="none" dirty="0"/>
+                        <a:t>-</a:t>
+                      </a:r>
                       <a:endParaRPr sz="900" u="none" strike="noStrike" cap="none" dirty="0"/>
                     </a:p>
                   </a:txBody>

</xml_diff>